<commit_message>
Updated presentation, payment, ccart_display
</commit_message>
<xml_diff>
--- a/Documents/Project.pptx
+++ b/Documents/Project.pptx
@@ -5,21 +5,22 @@
     <p:sldMasterId id="2147483658" r:id="rId4"/>
   </p:sldMasterIdLst>
   <p:notesMasterIdLst>
-    <p:notesMasterId r:id="rId14"/>
+    <p:notesMasterId r:id="rId15"/>
   </p:notesMasterIdLst>
   <p:handoutMasterIdLst>
-    <p:handoutMasterId r:id="rId15"/>
+    <p:handoutMasterId r:id="rId16"/>
   </p:handoutMasterIdLst>
   <p:sldIdLst>
     <p:sldId id="350" r:id="rId5"/>
-    <p:sldId id="361" r:id="rId6"/>
-    <p:sldId id="357" r:id="rId7"/>
-    <p:sldId id="369" r:id="rId8"/>
-    <p:sldId id="370" r:id="rId9"/>
-    <p:sldId id="371" r:id="rId10"/>
-    <p:sldId id="372" r:id="rId11"/>
-    <p:sldId id="368" r:id="rId12"/>
-    <p:sldId id="343" r:id="rId13"/>
+    <p:sldId id="369" r:id="rId6"/>
+    <p:sldId id="361" r:id="rId7"/>
+    <p:sldId id="357" r:id="rId8"/>
+    <p:sldId id="373" r:id="rId9"/>
+    <p:sldId id="370" r:id="rId10"/>
+    <p:sldId id="371" r:id="rId11"/>
+    <p:sldId id="372" r:id="rId12"/>
+    <p:sldId id="368" r:id="rId13"/>
+    <p:sldId id="343" r:id="rId14"/>
   </p:sldIdLst>
   <p:sldSz cx="12192000" cy="6858000"/>
   <p:notesSz cx="6858000" cy="9144000"/>
@@ -364,7 +365,7 @@
           <a:p>
             <a:fld id="{6EE7A52F-9D89-7442-A8E9-48D1527B5F6B}" type="datetimeFigureOut">
               <a:rPr lang="en-US" smtClean="0"/>
-              <a:t>10/24/2023</a:t>
+              <a:t>10/25/2023</a:t>
             </a:fld>
             <a:endParaRPr lang="en-US" dirty="0"/>
           </a:p>
@@ -780,7 +781,7 @@
           <a:p>
             <a:fld id="{A89C7E07-3C67-C64C-8DA0-0404F6303970}" type="slidenum">
               <a:rPr lang="en-US" smtClean="0"/>
-              <a:t>2</a:t>
+              <a:t>3</a:t>
             </a:fld>
             <a:endParaRPr lang="en-US" dirty="0"/>
           </a:p>
@@ -864,7 +865,7 @@
           <a:p>
             <a:fld id="{A89C7E07-3C67-C64C-8DA0-0404F6303970}" type="slidenum">
               <a:rPr lang="en-US" smtClean="0"/>
-              <a:t>9</a:t>
+              <a:t>10</a:t>
             </a:fld>
             <a:endParaRPr lang="en-US" dirty="0"/>
           </a:p>
@@ -2282,7 +2283,7 @@
               <a:rPr lang="en-US" smtClean="0">
                 <a:latin typeface="+mn-lt"/>
               </a:rPr>
-              <a:t>24 October 2023</a:t>
+              <a:t>25 October 2023</a:t>
             </a:fld>
             <a:endParaRPr lang="en-US" dirty="0">
               <a:latin typeface="+mn-lt"/>
@@ -3431,7 +3432,7 @@
               <a:rPr lang="en-US" smtClean="0">
                 <a:latin typeface="+mn-lt"/>
               </a:rPr>
-              <a:t>24 October 2023</a:t>
+              <a:t>25 October 2023</a:t>
             </a:fld>
             <a:endParaRPr lang="en-US" dirty="0">
               <a:latin typeface="+mn-lt"/>
@@ -4579,7 +4580,7 @@
               <a:rPr lang="en-US" smtClean="0">
                 <a:latin typeface="+mn-lt"/>
               </a:rPr>
-              <a:t>24 October 2023</a:t>
+              <a:t>25 October 2023</a:t>
             </a:fld>
             <a:endParaRPr lang="en-US" dirty="0">
               <a:latin typeface="+mn-lt"/>
@@ -6917,7 +6918,7 @@
               <a:rPr lang="en-US" smtClean="0">
                 <a:latin typeface="+mn-lt"/>
               </a:rPr>
-              <a:t>24 October 2023</a:t>
+              <a:t>25 October 2023</a:t>
             </a:fld>
             <a:endParaRPr lang="en-US" dirty="0">
               <a:latin typeface="+mn-lt"/>
@@ -7491,7 +7492,7 @@
               <a:rPr lang="en-US" smtClean="0">
                 <a:latin typeface="+mn-lt"/>
               </a:rPr>
-              <a:t>24 October 2023</a:t>
+              <a:t>25 October 2023</a:t>
             </a:fld>
             <a:endParaRPr lang="en-US" dirty="0">
               <a:latin typeface="+mn-lt"/>
@@ -8413,7 +8414,7 @@
               <a:rPr lang="en-US" smtClean="0">
                 <a:latin typeface="+mn-lt"/>
               </a:rPr>
-              <a:t>24 October 2023</a:t>
+              <a:t>25 October 2023</a:t>
             </a:fld>
             <a:endParaRPr lang="en-US" dirty="0">
               <a:latin typeface="+mn-lt"/>
@@ -8693,7 +8694,7 @@
               <a:rPr lang="en-US" smtClean="0">
                 <a:latin typeface="+mn-lt"/>
               </a:rPr>
-              <a:t>24 October 2023</a:t>
+              <a:t>25 October 2023</a:t>
             </a:fld>
             <a:endParaRPr lang="en-US" dirty="0">
               <a:latin typeface="+mn-lt"/>
@@ -11668,7 +11669,7 @@
               <a:rPr lang="en-US" smtClean="0">
                 <a:latin typeface="+mn-lt"/>
               </a:rPr>
-              <a:t>24 October 2023</a:t>
+              <a:t>25 October 2023</a:t>
             </a:fld>
             <a:endParaRPr lang="en-US" dirty="0">
               <a:latin typeface="+mn-lt"/>
@@ -12873,7 +12874,7 @@
               <a:rPr lang="en-US" smtClean="0">
                 <a:latin typeface="+mn-lt"/>
               </a:rPr>
-              <a:t>24 October 2023</a:t>
+              <a:t>25 October 2023</a:t>
             </a:fld>
             <a:endParaRPr lang="en-US" dirty="0">
               <a:latin typeface="+mn-lt"/>
@@ -13129,7 +13130,7 @@
               <a:rPr lang="en-US" smtClean="0">
                 <a:latin typeface="+mn-lt"/>
               </a:rPr>
-              <a:t>24 October 2023</a:t>
+              <a:t>25 October 2023</a:t>
             </a:fld>
             <a:endParaRPr lang="en-US" dirty="0">
               <a:latin typeface="+mn-lt"/>
@@ -13800,6 +13801,106 @@
 </p:sld>
 </file>
 
+<file path=ppt/slides/slide10.xml><?xml version="1.0" encoding="utf-8"?>
+<p:sld xmlns:a="http://schemas.openxmlformats.org/drawingml/2006/main" xmlns:r="http://schemas.openxmlformats.org/officeDocument/2006/relationships" xmlns:p="http://schemas.openxmlformats.org/presentationml/2006/main">
+  <p:cSld>
+    <p:spTree>
+      <p:nvGrpSpPr>
+        <p:cNvPr id="1" name=""/>
+        <p:cNvGrpSpPr/>
+        <p:nvPr/>
+      </p:nvGrpSpPr>
+      <p:grpSpPr>
+        <a:xfrm>
+          <a:off x="0" y="0"/>
+          <a:ext cx="0" cy="0"/>
+          <a:chOff x="0" y="0"/>
+          <a:chExt cx="0" cy="0"/>
+        </a:xfrm>
+      </p:grpSpPr>
+      <p:sp>
+        <p:nvSpPr>
+          <p:cNvPr id="2" name="Title 1">
+            <a:extLst>
+              <a:ext uri="{FF2B5EF4-FFF2-40B4-BE49-F238E27FC236}">
+                <a16:creationId xmlns:a16="http://schemas.microsoft.com/office/drawing/2014/main" id="{51DF3D98-3C30-4CFC-8643-C81E829C8C25}"/>
+              </a:ext>
+            </a:extLst>
+          </p:cNvPr>
+          <p:cNvSpPr>
+            <a:spLocks noGrp="1"/>
+          </p:cNvSpPr>
+          <p:nvPr>
+            <p:ph type="title"/>
+          </p:nvPr>
+        </p:nvSpPr>
+        <p:spPr>
+          <a:xfrm>
+            <a:off x="6896100" y="398440"/>
+            <a:ext cx="4903377" cy="2386081"/>
+          </a:xfrm>
+        </p:spPr>
+        <p:txBody>
+          <a:bodyPr/>
+          <a:lstStyle/>
+          <a:p>
+            <a:r>
+              <a:rPr lang="en-US" dirty="0"/>
+              <a:t>Thank you</a:t>
+            </a:r>
+          </a:p>
+        </p:txBody>
+      </p:sp>
+      <p:pic>
+        <p:nvPicPr>
+          <p:cNvPr id="13" name="Picture Placeholder 12" descr="Person running up stairs">
+            <a:extLst>
+              <a:ext uri="{FF2B5EF4-FFF2-40B4-BE49-F238E27FC236}">
+                <a16:creationId xmlns:a16="http://schemas.microsoft.com/office/drawing/2014/main" id="{EC944911-7CDD-41CC-A7F0-5B0CF85D545C}"/>
+              </a:ext>
+              <a:ext uri="{C183D7F6-B498-43B3-948B-1728B52AA6E4}">
+                <adec:decorative xmlns:adec="http://schemas.microsoft.com/office/drawing/2017/decorative" val="0"/>
+              </a:ext>
+            </a:extLst>
+          </p:cNvPr>
+          <p:cNvPicPr>
+            <a:picLocks noGrp="1" noChangeAspect="1"/>
+          </p:cNvPicPr>
+          <p:nvPr>
+            <p:ph type="pic" sz="quarter" idx="13"/>
+          </p:nvPr>
+        </p:nvPicPr>
+        <p:blipFill>
+          <a:blip r:embed="rId3">
+            <a:extLst>
+              <a:ext uri="{28A0092B-C50C-407E-A947-70E740481C1C}">
+                <a14:useLocalDpi xmlns:a14="http://schemas.microsoft.com/office/drawing/2010/main" val="0"/>
+              </a:ext>
+            </a:extLst>
+          </a:blip>
+          <a:srcRect/>
+          <a:stretch/>
+        </p:blipFill>
+        <p:spPr>
+          <a:xfrm>
+            <a:off x="0" y="0"/>
+            <a:ext cx="6096000" cy="6858000"/>
+          </a:xfrm>
+        </p:spPr>
+      </p:pic>
+    </p:spTree>
+    <p:extLst>
+      <p:ext uri="{BB962C8B-B14F-4D97-AF65-F5344CB8AC3E}">
+        <p14:creationId xmlns:p14="http://schemas.microsoft.com/office/powerpoint/2010/main" val="2336677316"/>
+      </p:ext>
+    </p:extLst>
+  </p:cSld>
+  <p:clrMapOvr>
+    <a:masterClrMapping/>
+  </p:clrMapOvr>
+</p:sld>
+</file>
+
 <file path=ppt/slides/slide2.xml><?xml version="1.0" encoding="utf-8"?>
 <p:sld xmlns:a="http://schemas.openxmlformats.org/drawingml/2006/main" xmlns:r="http://schemas.openxmlformats.org/officeDocument/2006/relationships" xmlns:p="http://schemas.openxmlformats.org/presentationml/2006/main">
   <p:cSld>
@@ -13819,10 +13920,10 @@
       </p:grpSpPr>
       <p:sp>
         <p:nvSpPr>
-          <p:cNvPr id="9" name="Title 8">
-            <a:extLst>
-              <a:ext uri="{FF2B5EF4-FFF2-40B4-BE49-F238E27FC236}">
-                <a16:creationId xmlns:a16="http://schemas.microsoft.com/office/drawing/2014/main" id="{0B06EEEB-3B0A-C5FF-0556-2418D262984D}"/>
+          <p:cNvPr id="3" name="Title 2">
+            <a:extLst>
+              <a:ext uri="{FF2B5EF4-FFF2-40B4-BE49-F238E27FC236}">
+                <a16:creationId xmlns:a16="http://schemas.microsoft.com/office/drawing/2014/main" id="{01EB1D7F-284F-6F46-99FA-EBB8ED69D7EA}"/>
               </a:ext>
             </a:extLst>
           </p:cNvPr>
@@ -13835,8 +13936,8 @@
         </p:nvSpPr>
         <p:spPr>
           <a:xfrm>
-            <a:off x="1233170" y="195538"/>
-            <a:ext cx="5970270" cy="1057829"/>
+            <a:off x="883920" y="506622"/>
+            <a:ext cx="10101579" cy="692256"/>
           </a:xfrm>
         </p:spPr>
         <p:txBody>
@@ -13845,17 +13946,17 @@
           <a:p>
             <a:r>
               <a:rPr lang="en-US" dirty="0"/>
-              <a:t>INTRODUCTION </a:t>
+              <a:t>INDEX</a:t>
             </a:r>
           </a:p>
         </p:txBody>
       </p:sp>
       <p:sp>
         <p:nvSpPr>
-          <p:cNvPr id="7" name="Slide Number Placeholder 6">
-            <a:extLst>
-              <a:ext uri="{FF2B5EF4-FFF2-40B4-BE49-F238E27FC236}">
-                <a16:creationId xmlns:a16="http://schemas.microsoft.com/office/drawing/2014/main" id="{F37669F0-EA6D-6B46-AF0E-A9C2D1F223DB}"/>
+          <p:cNvPr id="17" name="Slide Number Placeholder 16">
+            <a:extLst>
+              <a:ext uri="{FF2B5EF4-FFF2-40B4-BE49-F238E27FC236}">
+                <a16:creationId xmlns:a16="http://schemas.microsoft.com/office/drawing/2014/main" id="{32DA2B67-BDBB-C945-988B-6C0D86F697CE}"/>
               </a:ext>
             </a:extLst>
           </p:cNvPr>
@@ -13863,7 +13964,7 @@
             <a:spLocks noGrp="1"/>
           </p:cNvSpPr>
           <p:nvPr>
-            <p:ph type="sldNum" sz="quarter" idx="16"/>
+            <p:ph type="sldNum" sz="quarter" idx="34"/>
           </p:nvPr>
         </p:nvSpPr>
         <p:spPr>
@@ -13887,10 +13988,10 @@
       </p:sp>
       <p:sp>
         <p:nvSpPr>
-          <p:cNvPr id="37" name="Date Placeholder 36">
-            <a:extLst>
-              <a:ext uri="{FF2B5EF4-FFF2-40B4-BE49-F238E27FC236}">
-                <a16:creationId xmlns:a16="http://schemas.microsoft.com/office/drawing/2014/main" id="{F4B2ECEF-8D19-DCB0-0C03-29B418379850}"/>
+          <p:cNvPr id="4" name="Date Placeholder 3">
+            <a:extLst>
+              <a:ext uri="{FF2B5EF4-FFF2-40B4-BE49-F238E27FC236}">
+                <a16:creationId xmlns:a16="http://schemas.microsoft.com/office/drawing/2014/main" id="{9035E09D-D71E-2904-E048-C2FF9290B2BA}"/>
               </a:ext>
             </a:extLst>
           </p:cNvPr>
@@ -13901,30 +14002,29 @@
             <p:ph type="dt" sz="half" idx="2"/>
           </p:nvPr>
         </p:nvSpPr>
-        <p:spPr>
-          <a:xfrm>
-            <a:off x="2992120" y="6332220"/>
-            <a:ext cx="1313180" cy="247651"/>
-          </a:xfrm>
-        </p:spPr>
+        <p:spPr/>
         <p:txBody>
           <a:bodyPr/>
           <a:lstStyle/>
           <a:p>
-            <a:fld id="{D187F3CE-6D75-48DE-9E86-3286736E66E8}" type="datetime3">
-              <a:rPr lang="en-US" smtClean="0"/>
-              <a:t>24 October 2023</a:t>
+            <a:fld id="{CCC2975D-421E-48A1-B27B-6C94F7235AB6}" type="datetime3">
+              <a:rPr lang="en-US" smtClean="0">
+                <a:latin typeface="+mn-lt"/>
+              </a:rPr>
+              <a:t>25 October 2023</a:t>
             </a:fld>
-            <a:endParaRPr lang="en-US" dirty="0"/>
+            <a:endParaRPr lang="en-US" dirty="0">
+              <a:latin typeface="+mn-lt"/>
+            </a:endParaRPr>
           </a:p>
         </p:txBody>
       </p:sp>
       <p:sp>
         <p:nvSpPr>
-          <p:cNvPr id="11" name="Text Placeholder 10">
-            <a:extLst>
-              <a:ext uri="{FF2B5EF4-FFF2-40B4-BE49-F238E27FC236}">
-                <a16:creationId xmlns:a16="http://schemas.microsoft.com/office/drawing/2014/main" id="{CC44239B-7197-71B4-1A8B-5003C2311538}"/>
+          <p:cNvPr id="15" name="Text Placeholder 14">
+            <a:extLst>
+              <a:ext uri="{FF2B5EF4-FFF2-40B4-BE49-F238E27FC236}">
+                <a16:creationId xmlns:a16="http://schemas.microsoft.com/office/drawing/2014/main" id="{811A84BE-40FE-6C3E-A3F7-E6EF1971A3B8}"/>
               </a:ext>
             </a:extLst>
           </p:cNvPr>
@@ -13937,75 +14037,221 @@
         </p:nvSpPr>
         <p:spPr>
           <a:xfrm>
-            <a:off x="1233170" y="1604211"/>
-            <a:ext cx="10210800" cy="2891525"/>
+            <a:off x="883920" y="1164589"/>
+            <a:ext cx="5669280" cy="4931411"/>
           </a:xfrm>
           <a:solidFill>
             <a:schemeClr val="tx1">
-              <a:alpha val="87000"/>
+              <a:alpha val="80000"/>
             </a:schemeClr>
           </a:solidFill>
           <a:effectLst>
-            <a:softEdge rad="63500"/>
+            <a:softEdge rad="0"/>
           </a:effectLst>
         </p:spPr>
         <p:txBody>
-          <a:bodyPr>
-            <a:noAutofit/>
-          </a:bodyPr>
+          <a:bodyPr/>
           <a:lstStyle/>
           <a:p>
-            <a:pPr algn="just">
-              <a:buFont typeface="Arial" panose="020B0604020202020204" pitchFamily="34" charset="0"/>
-              <a:buChar char="•"/>
+            <a:pPr marL="893763" lvl="0" indent="-720725">
+              <a:lnSpc>
+                <a:spcPct val="115000"/>
+              </a:lnSpc>
+              <a:spcAft>
+                <a:spcPts val="800"/>
+              </a:spcAft>
+              <a:buFont typeface="Wingdings" panose="05000000000000000000" pitchFamily="2" charset="2"/>
+              <a:buChar char=""/>
+              <a:tabLst>
+                <a:tab pos="457200" algn="l"/>
+              </a:tabLst>
             </a:pPr>
             <a:r>
-              <a:rPr lang="en-GB" sz="2800" b="0" i="0" dirty="0">
+              <a:rPr lang="en-GB" sz="2400" b="1" i="1" kern="100" dirty="0">
                 <a:solidFill>
-                  <a:srgbClr val="374151"/>
+                  <a:srgbClr val="00B050"/>
                 </a:solidFill>
                 <a:effectLst/>
-                <a:latin typeface="+mj-lt"/>
+                <a:latin typeface="Times New Roman" panose="02020603050405020304" pitchFamily="18" charset="0"/>
+                <a:ea typeface="Calibri" panose="020F0502020204030204" pitchFamily="34" charset="0"/>
+                <a:cs typeface="Times New Roman" panose="02020603050405020304" pitchFamily="18" charset="0"/>
               </a:rPr>
-              <a:t>In a dynamic world, "SwapZone" emerges as the game-changer in the e-commerce arena.</a:t>
+              <a:t>Introduction</a:t>
             </a:r>
           </a:p>
           <a:p>
-            <a:pPr algn="just">
-              <a:buFont typeface="Arial" panose="020B0604020202020204" pitchFamily="34" charset="0"/>
-              <a:buChar char="•"/>
+            <a:pPr marL="893763" indent="-720725">
+              <a:lnSpc>
+                <a:spcPct val="115000"/>
+              </a:lnSpc>
+              <a:spcAft>
+                <a:spcPts val="800"/>
+              </a:spcAft>
+              <a:buFont typeface="Wingdings" panose="05000000000000000000" pitchFamily="2" charset="2"/>
+              <a:buChar char=""/>
+              <a:tabLst>
+                <a:tab pos="457200" algn="l"/>
+              </a:tabLst>
             </a:pPr>
             <a:r>
-              <a:rPr lang="en-GB" sz="2800" b="0" i="0" dirty="0">
+              <a:rPr lang="en-GB" sz="2400" b="1" i="1" kern="100" dirty="0">
                 <a:solidFill>
-                  <a:srgbClr val="374151"/>
+                  <a:srgbClr val="00B050"/>
+                </a:solidFill>
+                <a:latin typeface="Times New Roman" panose="02020603050405020304" pitchFamily="18" charset="0"/>
+                <a:ea typeface="Calibri" panose="020F0502020204030204" pitchFamily="34" charset="0"/>
+                <a:cs typeface="Times New Roman" panose="02020603050405020304" pitchFamily="18" charset="0"/>
+              </a:rPr>
+              <a:t>Users</a:t>
+            </a:r>
+          </a:p>
+          <a:p>
+            <a:pPr marL="893763" indent="-720725">
+              <a:lnSpc>
+                <a:spcPct val="115000"/>
+              </a:lnSpc>
+              <a:spcAft>
+                <a:spcPts val="800"/>
+              </a:spcAft>
+              <a:buFont typeface="Wingdings" panose="05000000000000000000" pitchFamily="2" charset="2"/>
+              <a:buChar char=""/>
+              <a:tabLst>
+                <a:tab pos="457200" algn="l"/>
+              </a:tabLst>
+            </a:pPr>
+            <a:r>
+              <a:rPr lang="en-GB" sz="2400" b="1" i="1" kern="100" dirty="0">
+                <a:solidFill>
+                  <a:srgbClr val="00B050"/>
                 </a:solidFill>
                 <a:effectLst/>
-                <a:latin typeface="+mj-lt"/>
+                <a:latin typeface="Times New Roman" panose="02020603050405020304" pitchFamily="18" charset="0"/>
+                <a:ea typeface="Calibri" panose="020F0502020204030204" pitchFamily="34" charset="0"/>
+                <a:cs typeface="Times New Roman" panose="02020603050405020304" pitchFamily="18" charset="0"/>
               </a:rPr>
-              <a:t>Today, we'll embark on a journey through the heart of our project, exploring the innovative features of the Customer, Admin, and Seller modules.</a:t>
+              <a:t>Customer</a:t>
             </a:r>
           </a:p>
           <a:p>
-            <a:pPr algn="just">
-              <a:buFont typeface="Arial" panose="020B0604020202020204" pitchFamily="34" charset="0"/>
-              <a:buChar char="•"/>
+            <a:pPr marL="893763" indent="-720725">
+              <a:lnSpc>
+                <a:spcPct val="115000"/>
+              </a:lnSpc>
+              <a:spcAft>
+                <a:spcPts val="800"/>
+              </a:spcAft>
+              <a:buFont typeface="Wingdings" panose="05000000000000000000" pitchFamily="2" charset="2"/>
+              <a:buChar char=""/>
+              <a:tabLst>
+                <a:tab pos="457200" algn="l"/>
+              </a:tabLst>
             </a:pPr>
             <a:r>
-              <a:rPr lang="en-GB" sz="2800" b="0" i="0" dirty="0">
+              <a:rPr lang="en-GB" sz="2400" b="1" i="1" kern="100" dirty="0">
                 <a:solidFill>
-                  <a:srgbClr val="374151"/>
+                  <a:srgbClr val="00B050"/>
                 </a:solidFill>
-                <a:effectLst/>
-                <a:latin typeface="+mj-lt"/>
+                <a:latin typeface="Times New Roman" panose="02020603050405020304" pitchFamily="18" charset="0"/>
+                <a:ea typeface="Calibri" panose="020F0502020204030204" pitchFamily="34" charset="0"/>
+                <a:cs typeface="Times New Roman" panose="02020603050405020304" pitchFamily="18" charset="0"/>
               </a:rPr>
-              <a:t>SwapZone caters to the demands of modern consumers and tech-savvy sellers alike, offering a seamless experience from registration to sale analysis.</a:t>
+              <a:t>Admin</a:t>
             </a:r>
-          </a:p>
-          <a:p>
-            <a:pPr algn="just"/>
-            <a:endParaRPr lang="en-US" sz="2400" dirty="0">
-              <a:latin typeface="+mj-lt"/>
+            <a:endParaRPr lang="en-GB" sz="2400" b="1" i="1" kern="100" dirty="0">
+              <a:solidFill>
+                <a:srgbClr val="00B050"/>
+              </a:solidFill>
+              <a:effectLst/>
+              <a:latin typeface="Times New Roman" panose="02020603050405020304" pitchFamily="18" charset="0"/>
+              <a:ea typeface="Calibri" panose="020F0502020204030204" pitchFamily="34" charset="0"/>
+              <a:cs typeface="Times New Roman" panose="02020603050405020304" pitchFamily="18" charset="0"/>
+            </a:endParaRPr>
+          </a:p>
+          <a:p>
+            <a:pPr marL="893763" indent="-720725">
+              <a:lnSpc>
+                <a:spcPct val="115000"/>
+              </a:lnSpc>
+              <a:spcAft>
+                <a:spcPts val="800"/>
+              </a:spcAft>
+              <a:buFont typeface="Wingdings" panose="05000000000000000000" pitchFamily="2" charset="2"/>
+              <a:buChar char=""/>
+              <a:tabLst>
+                <a:tab pos="457200" algn="l"/>
+              </a:tabLst>
+            </a:pPr>
+            <a:r>
+              <a:rPr lang="en-GB" sz="2400" b="1" i="1" kern="100" dirty="0">
+                <a:solidFill>
+                  <a:srgbClr val="00B050"/>
+                </a:solidFill>
+                <a:latin typeface="Times New Roman" panose="02020603050405020304" pitchFamily="18" charset="0"/>
+                <a:ea typeface="Calibri" panose="020F0502020204030204" pitchFamily="34" charset="0"/>
+                <a:cs typeface="Times New Roman" panose="02020603050405020304" pitchFamily="18" charset="0"/>
+              </a:rPr>
+              <a:t>Seller</a:t>
+            </a:r>
+          </a:p>
+          <a:p>
+            <a:pPr marL="893763" indent="-720725">
+              <a:lnSpc>
+                <a:spcPct val="115000"/>
+              </a:lnSpc>
+              <a:spcAft>
+                <a:spcPts val="800"/>
+              </a:spcAft>
+              <a:buFont typeface="Wingdings" panose="05000000000000000000" pitchFamily="2" charset="2"/>
+              <a:buChar char=""/>
+              <a:tabLst>
+                <a:tab pos="457200" algn="l"/>
+              </a:tabLst>
+            </a:pPr>
+            <a:r>
+              <a:rPr lang="en-GB" sz="2400" b="1" i="1" kern="100" dirty="0">
+                <a:solidFill>
+                  <a:srgbClr val="00B050"/>
+                </a:solidFill>
+                <a:latin typeface="Times New Roman" panose="02020603050405020304" pitchFamily="18" charset="0"/>
+                <a:ea typeface="Calibri" panose="020F0502020204030204" pitchFamily="34" charset="0"/>
+                <a:cs typeface="Times New Roman" panose="02020603050405020304" pitchFamily="18" charset="0"/>
+              </a:rPr>
+              <a:t>Technologies</a:t>
+            </a:r>
+          </a:p>
+          <a:p>
+            <a:pPr marL="893763" indent="-720725">
+              <a:lnSpc>
+                <a:spcPct val="115000"/>
+              </a:lnSpc>
+              <a:spcAft>
+                <a:spcPts val="800"/>
+              </a:spcAft>
+              <a:buFont typeface="Wingdings" panose="05000000000000000000" pitchFamily="2" charset="2"/>
+              <a:buChar char=""/>
+              <a:tabLst>
+                <a:tab pos="457200" algn="l"/>
+              </a:tabLst>
+            </a:pPr>
+            <a:r>
+              <a:rPr lang="en-GB" sz="2400" b="1" i="1" kern="100" dirty="0">
+                <a:solidFill>
+                  <a:srgbClr val="00B050"/>
+                </a:solidFill>
+                <a:latin typeface="Times New Roman" panose="02020603050405020304" pitchFamily="18" charset="0"/>
+                <a:ea typeface="Calibri" panose="020F0502020204030204" pitchFamily="34" charset="0"/>
+                <a:cs typeface="Times New Roman" panose="02020603050405020304" pitchFamily="18" charset="0"/>
+              </a:rPr>
+              <a:t>Future Scope</a:t>
+            </a:r>
+            <a:endParaRPr lang="en-GB" sz="2400" b="1" i="1" kern="100" dirty="0">
+              <a:solidFill>
+                <a:srgbClr val="00B050"/>
+              </a:solidFill>
+              <a:effectLst/>
+              <a:latin typeface="Times New Roman" panose="02020603050405020304" pitchFamily="18" charset="0"/>
+              <a:ea typeface="Calibri" panose="020F0502020204030204" pitchFamily="34" charset="0"/>
+              <a:cs typeface="Times New Roman" panose="02020603050405020304" pitchFamily="18" charset="0"/>
             </a:endParaRPr>
           </a:p>
         </p:txBody>
@@ -14013,7 +14259,7 @@
     </p:spTree>
     <p:extLst>
       <p:ext uri="{BB962C8B-B14F-4D97-AF65-F5344CB8AC3E}">
-        <p14:creationId xmlns:p14="http://schemas.microsoft.com/office/powerpoint/2010/main" val="391246093"/>
+        <p14:creationId xmlns:p14="http://schemas.microsoft.com/office/powerpoint/2010/main" val="3103488635"/>
       </p:ext>
     </p:extLst>
   </p:cSld>
@@ -14042,10 +14288,10 @@
       </p:grpSpPr>
       <p:sp>
         <p:nvSpPr>
-          <p:cNvPr id="2" name="Title 1">
-            <a:extLst>
-              <a:ext uri="{FF2B5EF4-FFF2-40B4-BE49-F238E27FC236}">
-                <a16:creationId xmlns:a16="http://schemas.microsoft.com/office/drawing/2014/main" id="{00319620-6CCC-A34D-9D45-D6B57F800708}"/>
+          <p:cNvPr id="9" name="Title 8">
+            <a:extLst>
+              <a:ext uri="{FF2B5EF4-FFF2-40B4-BE49-F238E27FC236}">
+                <a16:creationId xmlns:a16="http://schemas.microsoft.com/office/drawing/2014/main" id="{0B06EEEB-3B0A-C5FF-0556-2418D262984D}"/>
               </a:ext>
             </a:extLst>
           </p:cNvPr>
@@ -14058,8 +14304,8 @@
         </p:nvSpPr>
         <p:spPr>
           <a:xfrm>
-            <a:off x="964023" y="205247"/>
-            <a:ext cx="10169152" cy="1284679"/>
+            <a:off x="1233170" y="195538"/>
+            <a:ext cx="5970270" cy="1057829"/>
           </a:xfrm>
         </p:spPr>
         <p:txBody>
@@ -14068,17 +14314,17 @@
           <a:p>
             <a:r>
               <a:rPr lang="en-US" dirty="0"/>
-              <a:t>Users</a:t>
+              <a:t>INTRODUCTION </a:t>
             </a:r>
           </a:p>
         </p:txBody>
       </p:sp>
       <p:sp>
         <p:nvSpPr>
-          <p:cNvPr id="4" name="Text Placeholder 3">
-            <a:extLst>
-              <a:ext uri="{FF2B5EF4-FFF2-40B4-BE49-F238E27FC236}">
-                <a16:creationId xmlns:a16="http://schemas.microsoft.com/office/drawing/2014/main" id="{86655189-E7B2-3A4A-99EE-997592791F7D}"/>
+          <p:cNvPr id="7" name="Slide Number Placeholder 6">
+            <a:extLst>
+              <a:ext uri="{FF2B5EF4-FFF2-40B4-BE49-F238E27FC236}">
+                <a16:creationId xmlns:a16="http://schemas.microsoft.com/office/drawing/2014/main" id="{F37669F0-EA6D-6B46-AF0E-A9C2D1F223DB}"/>
               </a:ext>
             </a:extLst>
           </p:cNvPr>
@@ -14086,106 +14332,7 @@
             <a:spLocks noGrp="1"/>
           </p:cNvSpPr>
           <p:nvPr>
-            <p:ph type="body" sz="quarter" idx="11"/>
-          </p:nvPr>
-        </p:nvSpPr>
-        <p:spPr>
-          <a:xfrm>
-            <a:off x="2171700" y="2721764"/>
-            <a:ext cx="2133600" cy="546841"/>
-          </a:xfrm>
-        </p:spPr>
-        <p:txBody>
-          <a:bodyPr/>
-          <a:lstStyle/>
-          <a:p>
-            <a:r>
-              <a:rPr lang="en-US" sz="3200" dirty="0"/>
-              <a:t>Customer</a:t>
-            </a:r>
-          </a:p>
-        </p:txBody>
-      </p:sp>
-      <p:sp>
-        <p:nvSpPr>
-          <p:cNvPr id="6" name="Text Placeholder 5">
-            <a:extLst>
-              <a:ext uri="{FF2B5EF4-FFF2-40B4-BE49-F238E27FC236}">
-                <a16:creationId xmlns:a16="http://schemas.microsoft.com/office/drawing/2014/main" id="{8D4284CF-DF13-E947-ADA5-0FD9AAC03C23}"/>
-              </a:ext>
-            </a:extLst>
-          </p:cNvPr>
-          <p:cNvSpPr>
-            <a:spLocks noGrp="1"/>
-          </p:cNvSpPr>
-          <p:nvPr>
-            <p:ph type="body" sz="quarter" idx="31"/>
-          </p:nvPr>
-        </p:nvSpPr>
-        <p:spPr>
-          <a:xfrm>
-            <a:off x="5624999" y="4666429"/>
-            <a:ext cx="2133600" cy="546841"/>
-          </a:xfrm>
-        </p:spPr>
-        <p:txBody>
-          <a:bodyPr/>
-          <a:lstStyle/>
-          <a:p>
-            <a:r>
-              <a:rPr lang="en-US" sz="3200" dirty="0"/>
-              <a:t>Seller</a:t>
-            </a:r>
-          </a:p>
-        </p:txBody>
-      </p:sp>
-      <p:sp>
-        <p:nvSpPr>
-          <p:cNvPr id="10" name="Text Placeholder 9">
-            <a:extLst>
-              <a:ext uri="{FF2B5EF4-FFF2-40B4-BE49-F238E27FC236}">
-                <a16:creationId xmlns:a16="http://schemas.microsoft.com/office/drawing/2014/main" id="{9C396C20-F6DF-C940-BE16-6E008BFF9CB9}"/>
-              </a:ext>
-            </a:extLst>
-          </p:cNvPr>
-          <p:cNvSpPr>
-            <a:spLocks noGrp="1"/>
-          </p:cNvSpPr>
-          <p:nvPr>
-            <p:ph type="body" sz="quarter" idx="35"/>
-          </p:nvPr>
-        </p:nvSpPr>
-        <p:spPr>
-          <a:xfrm>
-            <a:off x="7586222" y="2721763"/>
-            <a:ext cx="2675377" cy="546841"/>
-          </a:xfrm>
-        </p:spPr>
-        <p:txBody>
-          <a:bodyPr/>
-          <a:lstStyle/>
-          <a:p>
-            <a:r>
-              <a:rPr lang="en-US" sz="3200" dirty="0"/>
-              <a:t>Administrator</a:t>
-            </a:r>
-          </a:p>
-        </p:txBody>
-      </p:sp>
-      <p:sp>
-        <p:nvSpPr>
-          <p:cNvPr id="13" name="Slide Number Placeholder 12">
-            <a:extLst>
-              <a:ext uri="{FF2B5EF4-FFF2-40B4-BE49-F238E27FC236}">
-                <a16:creationId xmlns:a16="http://schemas.microsoft.com/office/drawing/2014/main" id="{B2B0E625-26CC-9744-9B92-56905E797B65}"/>
-              </a:ext>
-            </a:extLst>
-          </p:cNvPr>
-          <p:cNvSpPr>
-            <a:spLocks noGrp="1"/>
-          </p:cNvSpPr>
-          <p:nvPr>
-            <p:ph type="sldNum" sz="quarter" idx="38"/>
+            <p:ph type="sldNum" sz="quarter" idx="16"/>
           </p:nvPr>
         </p:nvSpPr>
         <p:spPr>
@@ -14209,10 +14356,10 @@
       </p:sp>
       <p:sp>
         <p:nvSpPr>
-          <p:cNvPr id="14" name="Date Placeholder 13">
-            <a:extLst>
-              <a:ext uri="{FF2B5EF4-FFF2-40B4-BE49-F238E27FC236}">
-                <a16:creationId xmlns:a16="http://schemas.microsoft.com/office/drawing/2014/main" id="{3148458E-E475-67C0-76EE-E966A9615AC4}"/>
+          <p:cNvPr id="37" name="Date Placeholder 36">
+            <a:extLst>
+              <a:ext uri="{FF2B5EF4-FFF2-40B4-BE49-F238E27FC236}">
+                <a16:creationId xmlns:a16="http://schemas.microsoft.com/office/drawing/2014/main" id="{F4B2ECEF-8D19-DCB0-0C03-29B418379850}"/>
               </a:ext>
             </a:extLst>
           </p:cNvPr>
@@ -14223,19 +14370,111 @@
             <p:ph type="dt" sz="half" idx="2"/>
           </p:nvPr>
         </p:nvSpPr>
-        <p:spPr/>
+        <p:spPr>
+          <a:xfrm>
+            <a:off x="2992120" y="6332220"/>
+            <a:ext cx="1313180" cy="247651"/>
+          </a:xfrm>
+        </p:spPr>
         <p:txBody>
           <a:bodyPr/>
           <a:lstStyle/>
           <a:p>
-            <a:fld id="{B37174CB-6E65-49C6-A2EE-3CC8F1772E5D}" type="datetime3">
-              <a:rPr lang="en-US" smtClean="0">
-                <a:latin typeface="+mn-lt"/>
+            <a:fld id="{D187F3CE-6D75-48DE-9E86-3286736E66E8}" type="datetime3">
+              <a:rPr lang="en-US" smtClean="0"/>
+              <a:t>25 October 2023</a:t>
+            </a:fld>
+            <a:endParaRPr lang="en-US" dirty="0"/>
+          </a:p>
+        </p:txBody>
+      </p:sp>
+      <p:sp>
+        <p:nvSpPr>
+          <p:cNvPr id="11" name="Text Placeholder 10">
+            <a:extLst>
+              <a:ext uri="{FF2B5EF4-FFF2-40B4-BE49-F238E27FC236}">
+                <a16:creationId xmlns:a16="http://schemas.microsoft.com/office/drawing/2014/main" id="{CC44239B-7197-71B4-1A8B-5003C2311538}"/>
+              </a:ext>
+            </a:extLst>
+          </p:cNvPr>
+          <p:cNvSpPr>
+            <a:spLocks noGrp="1"/>
+          </p:cNvSpPr>
+          <p:nvPr>
+            <p:ph type="body" sz="quarter" idx="11"/>
+          </p:nvPr>
+        </p:nvSpPr>
+        <p:spPr>
+          <a:xfrm>
+            <a:off x="1233170" y="1604211"/>
+            <a:ext cx="10210800" cy="2891525"/>
+          </a:xfrm>
+          <a:solidFill>
+            <a:schemeClr val="tx1">
+              <a:alpha val="87000"/>
+            </a:schemeClr>
+          </a:solidFill>
+          <a:effectLst>
+            <a:softEdge rad="63500"/>
+          </a:effectLst>
+        </p:spPr>
+        <p:txBody>
+          <a:bodyPr>
+            <a:noAutofit/>
+          </a:bodyPr>
+          <a:lstStyle/>
+          <a:p>
+            <a:pPr algn="just">
+              <a:buFont typeface="Arial" panose="020B0604020202020204" pitchFamily="34" charset="0"/>
+              <a:buChar char="•"/>
+            </a:pPr>
+            <a:r>
+              <a:rPr lang="en-GB" sz="2800" b="0" i="0" dirty="0">
+                <a:solidFill>
+                  <a:srgbClr val="374151"/>
+                </a:solidFill>
+                <a:effectLst/>
+                <a:latin typeface="+mj-lt"/>
               </a:rPr>
-              <a:t>24 October 2023</a:t>
-            </a:fld>
-            <a:endParaRPr lang="en-US" dirty="0">
-              <a:latin typeface="+mn-lt"/>
+              <a:t>In a dynamic world, "SwapZone" emerges as the game-changer in the e-commerce arena.</a:t>
+            </a:r>
+          </a:p>
+          <a:p>
+            <a:pPr algn="just">
+              <a:buFont typeface="Arial" panose="020B0604020202020204" pitchFamily="34" charset="0"/>
+              <a:buChar char="•"/>
+            </a:pPr>
+            <a:r>
+              <a:rPr lang="en-GB" sz="2800" b="0" i="0" dirty="0">
+                <a:solidFill>
+                  <a:srgbClr val="374151"/>
+                </a:solidFill>
+                <a:effectLst/>
+                <a:latin typeface="+mj-lt"/>
+              </a:rPr>
+              <a:t>Today, we'll embark on a journey through the heart of our project, exploring the innovative features of the Customer, Admin, and Seller modules.</a:t>
+            </a:r>
+          </a:p>
+          <a:p>
+            <a:pPr algn="just">
+              <a:buFont typeface="Arial" panose="020B0604020202020204" pitchFamily="34" charset="0"/>
+              <a:buChar char="•"/>
+            </a:pPr>
+            <a:r>
+              <a:rPr lang="en-GB" sz="2800" b="0" i="0" dirty="0">
+                <a:solidFill>
+                  <a:srgbClr val="374151"/>
+                </a:solidFill>
+                <a:effectLst/>
+                <a:latin typeface="+mj-lt"/>
+              </a:rPr>
+              <a:t>SwapZone caters to the demands of modern consumers and tech-savvy sellers alike, offering a seamless experience from registration to sale analysis.</a:t>
+            </a:r>
+          </a:p>
+          <a:p>
+            <a:pPr algn="just"/>
+            <a:endParaRPr lang="en-US" sz="2400" dirty="0">
+              <a:latin typeface="+mj-lt"/>
             </a:endParaRPr>
           </a:p>
         </p:txBody>
@@ -14243,7 +14482,7 @@
     </p:spTree>
     <p:extLst>
       <p:ext uri="{BB962C8B-B14F-4D97-AF65-F5344CB8AC3E}">
-        <p14:creationId xmlns:p14="http://schemas.microsoft.com/office/powerpoint/2010/main" val="2509101887"/>
+        <p14:creationId xmlns:p14="http://schemas.microsoft.com/office/powerpoint/2010/main" val="391246093"/>
       </p:ext>
     </p:extLst>
   </p:cSld>
@@ -14272,6 +14511,236 @@
       </p:grpSpPr>
       <p:sp>
         <p:nvSpPr>
+          <p:cNvPr id="2" name="Title 1">
+            <a:extLst>
+              <a:ext uri="{FF2B5EF4-FFF2-40B4-BE49-F238E27FC236}">
+                <a16:creationId xmlns:a16="http://schemas.microsoft.com/office/drawing/2014/main" id="{00319620-6CCC-A34D-9D45-D6B57F800708}"/>
+              </a:ext>
+            </a:extLst>
+          </p:cNvPr>
+          <p:cNvSpPr>
+            <a:spLocks noGrp="1"/>
+          </p:cNvSpPr>
+          <p:nvPr>
+            <p:ph type="title"/>
+          </p:nvPr>
+        </p:nvSpPr>
+        <p:spPr>
+          <a:xfrm>
+            <a:off x="964023" y="205247"/>
+            <a:ext cx="10169152" cy="1284679"/>
+          </a:xfrm>
+        </p:spPr>
+        <p:txBody>
+          <a:bodyPr/>
+          <a:lstStyle/>
+          <a:p>
+            <a:r>
+              <a:rPr lang="en-US" dirty="0"/>
+              <a:t>Users</a:t>
+            </a:r>
+          </a:p>
+        </p:txBody>
+      </p:sp>
+      <p:sp>
+        <p:nvSpPr>
+          <p:cNvPr id="4" name="Text Placeholder 3">
+            <a:extLst>
+              <a:ext uri="{FF2B5EF4-FFF2-40B4-BE49-F238E27FC236}">
+                <a16:creationId xmlns:a16="http://schemas.microsoft.com/office/drawing/2014/main" id="{86655189-E7B2-3A4A-99EE-997592791F7D}"/>
+              </a:ext>
+            </a:extLst>
+          </p:cNvPr>
+          <p:cNvSpPr>
+            <a:spLocks noGrp="1"/>
+          </p:cNvSpPr>
+          <p:nvPr>
+            <p:ph type="body" sz="quarter" idx="11"/>
+          </p:nvPr>
+        </p:nvSpPr>
+        <p:spPr>
+          <a:xfrm>
+            <a:off x="2171700" y="2721764"/>
+            <a:ext cx="2133600" cy="546841"/>
+          </a:xfrm>
+        </p:spPr>
+        <p:txBody>
+          <a:bodyPr/>
+          <a:lstStyle/>
+          <a:p>
+            <a:r>
+              <a:rPr lang="en-US" sz="3200" dirty="0"/>
+              <a:t>Customer</a:t>
+            </a:r>
+          </a:p>
+        </p:txBody>
+      </p:sp>
+      <p:sp>
+        <p:nvSpPr>
+          <p:cNvPr id="6" name="Text Placeholder 5">
+            <a:extLst>
+              <a:ext uri="{FF2B5EF4-FFF2-40B4-BE49-F238E27FC236}">
+                <a16:creationId xmlns:a16="http://schemas.microsoft.com/office/drawing/2014/main" id="{8D4284CF-DF13-E947-ADA5-0FD9AAC03C23}"/>
+              </a:ext>
+            </a:extLst>
+          </p:cNvPr>
+          <p:cNvSpPr>
+            <a:spLocks noGrp="1"/>
+          </p:cNvSpPr>
+          <p:nvPr>
+            <p:ph type="body" sz="quarter" idx="31"/>
+          </p:nvPr>
+        </p:nvSpPr>
+        <p:spPr>
+          <a:xfrm>
+            <a:off x="5624999" y="4666429"/>
+            <a:ext cx="2133600" cy="546841"/>
+          </a:xfrm>
+        </p:spPr>
+        <p:txBody>
+          <a:bodyPr/>
+          <a:lstStyle/>
+          <a:p>
+            <a:r>
+              <a:rPr lang="en-US" sz="3200" dirty="0"/>
+              <a:t>Seller</a:t>
+            </a:r>
+          </a:p>
+        </p:txBody>
+      </p:sp>
+      <p:sp>
+        <p:nvSpPr>
+          <p:cNvPr id="10" name="Text Placeholder 9">
+            <a:extLst>
+              <a:ext uri="{FF2B5EF4-FFF2-40B4-BE49-F238E27FC236}">
+                <a16:creationId xmlns:a16="http://schemas.microsoft.com/office/drawing/2014/main" id="{9C396C20-F6DF-C940-BE16-6E008BFF9CB9}"/>
+              </a:ext>
+            </a:extLst>
+          </p:cNvPr>
+          <p:cNvSpPr>
+            <a:spLocks noGrp="1"/>
+          </p:cNvSpPr>
+          <p:nvPr>
+            <p:ph type="body" sz="quarter" idx="35"/>
+          </p:nvPr>
+        </p:nvSpPr>
+        <p:spPr>
+          <a:xfrm>
+            <a:off x="7586222" y="2721763"/>
+            <a:ext cx="2675377" cy="546841"/>
+          </a:xfrm>
+        </p:spPr>
+        <p:txBody>
+          <a:bodyPr/>
+          <a:lstStyle/>
+          <a:p>
+            <a:r>
+              <a:rPr lang="en-US" sz="3200" dirty="0"/>
+              <a:t>Administrator</a:t>
+            </a:r>
+          </a:p>
+        </p:txBody>
+      </p:sp>
+      <p:sp>
+        <p:nvSpPr>
+          <p:cNvPr id="13" name="Slide Number Placeholder 12">
+            <a:extLst>
+              <a:ext uri="{FF2B5EF4-FFF2-40B4-BE49-F238E27FC236}">
+                <a16:creationId xmlns:a16="http://schemas.microsoft.com/office/drawing/2014/main" id="{B2B0E625-26CC-9744-9B92-56905E797B65}"/>
+              </a:ext>
+            </a:extLst>
+          </p:cNvPr>
+          <p:cNvSpPr>
+            <a:spLocks noGrp="1"/>
+          </p:cNvSpPr>
+          <p:nvPr>
+            <p:ph type="sldNum" sz="quarter" idx="38"/>
+          </p:nvPr>
+        </p:nvSpPr>
+        <p:spPr>
+          <a:xfrm>
+            <a:off x="971550" y="6332220"/>
+            <a:ext cx="523240" cy="247651"/>
+          </a:xfrm>
+        </p:spPr>
+        <p:txBody>
+          <a:bodyPr/>
+          <a:lstStyle/>
+          <a:p>
+            <a:fld id="{294A09A9-5501-47C1-A89A-A340965A2BE2}" type="slidenum">
+              <a:rPr lang="en-US" smtClean="0"/>
+              <a:pPr/>
+              <a:t>4</a:t>
+            </a:fld>
+            <a:endParaRPr lang="en-US" dirty="0"/>
+          </a:p>
+        </p:txBody>
+      </p:sp>
+      <p:sp>
+        <p:nvSpPr>
+          <p:cNvPr id="14" name="Date Placeholder 13">
+            <a:extLst>
+              <a:ext uri="{FF2B5EF4-FFF2-40B4-BE49-F238E27FC236}">
+                <a16:creationId xmlns:a16="http://schemas.microsoft.com/office/drawing/2014/main" id="{3148458E-E475-67C0-76EE-E966A9615AC4}"/>
+              </a:ext>
+            </a:extLst>
+          </p:cNvPr>
+          <p:cNvSpPr>
+            <a:spLocks noGrp="1"/>
+          </p:cNvSpPr>
+          <p:nvPr>
+            <p:ph type="dt" sz="half" idx="2"/>
+          </p:nvPr>
+        </p:nvSpPr>
+        <p:spPr/>
+        <p:txBody>
+          <a:bodyPr/>
+          <a:lstStyle/>
+          <a:p>
+            <a:fld id="{B37174CB-6E65-49C6-A2EE-3CC8F1772E5D}" type="datetime3">
+              <a:rPr lang="en-US" smtClean="0">
+                <a:latin typeface="+mn-lt"/>
+              </a:rPr>
+              <a:t>25 October 2023</a:t>
+            </a:fld>
+            <a:endParaRPr lang="en-US" dirty="0">
+              <a:latin typeface="+mn-lt"/>
+            </a:endParaRPr>
+          </a:p>
+        </p:txBody>
+      </p:sp>
+    </p:spTree>
+    <p:extLst>
+      <p:ext uri="{BB962C8B-B14F-4D97-AF65-F5344CB8AC3E}">
+        <p14:creationId xmlns:p14="http://schemas.microsoft.com/office/powerpoint/2010/main" val="2509101887"/>
+      </p:ext>
+    </p:extLst>
+  </p:cSld>
+  <p:clrMapOvr>
+    <a:masterClrMapping/>
+  </p:clrMapOvr>
+</p:sld>
+</file>
+
+<file path=ppt/slides/slide5.xml><?xml version="1.0" encoding="utf-8"?>
+<p:sld xmlns:a="http://schemas.openxmlformats.org/drawingml/2006/main" xmlns:r="http://schemas.openxmlformats.org/officeDocument/2006/relationships" xmlns:p="http://schemas.openxmlformats.org/presentationml/2006/main">
+  <p:cSld>
+    <p:spTree>
+      <p:nvGrpSpPr>
+        <p:cNvPr id="1" name=""/>
+        <p:cNvGrpSpPr/>
+        <p:nvPr/>
+      </p:nvGrpSpPr>
+      <p:grpSpPr>
+        <a:xfrm>
+          <a:off x="0" y="0"/>
+          <a:ext cx="0" cy="0"/>
+          <a:chOff x="0" y="0"/>
+          <a:chExt cx="0" cy="0"/>
+        </a:xfrm>
+      </p:grpSpPr>
+      <p:sp>
+        <p:nvSpPr>
           <p:cNvPr id="3" name="Title 2">
             <a:extLst>
               <a:ext uri="{FF2B5EF4-FFF2-40B4-BE49-F238E27FC236}">
@@ -14332,7 +14801,7 @@
             <a:fld id="{294A09A9-5501-47C1-A89A-A340965A2BE2}" type="slidenum">
               <a:rPr lang="en-US" smtClean="0"/>
               <a:pPr/>
-              <a:t>4</a:t>
+              <a:t>5</a:t>
             </a:fld>
             <a:endParaRPr lang="en-US" dirty="0"/>
           </a:p>
@@ -14363,7 +14832,7 @@
               <a:rPr lang="en-US" smtClean="0">
                 <a:latin typeface="+mn-lt"/>
               </a:rPr>
-              <a:t>24 October 2023</a:t>
+              <a:t>25 October 2023</a:t>
             </a:fld>
             <a:endParaRPr lang="en-US" dirty="0">
               <a:latin typeface="+mn-lt"/>
@@ -14661,7 +15130,7 @@
     </p:spTree>
     <p:extLst>
       <p:ext uri="{BB962C8B-B14F-4D97-AF65-F5344CB8AC3E}">
-        <p14:creationId xmlns:p14="http://schemas.microsoft.com/office/powerpoint/2010/main" val="3103488635"/>
+        <p14:creationId xmlns:p14="http://schemas.microsoft.com/office/powerpoint/2010/main" val="1107694493"/>
       </p:ext>
     </p:extLst>
   </p:cSld>
@@ -14671,7 +15140,7 @@
 </p:sld>
 </file>
 
-<file path=ppt/slides/slide5.xml><?xml version="1.0" encoding="utf-8"?>
+<file path=ppt/slides/slide6.xml><?xml version="1.0" encoding="utf-8"?>
 <p:sld xmlns:a="http://schemas.openxmlformats.org/drawingml/2006/main" xmlns:r="http://schemas.openxmlformats.org/officeDocument/2006/relationships" xmlns:p="http://schemas.openxmlformats.org/presentationml/2006/main">
   <p:cSld>
     <p:spTree>
@@ -14750,7 +15219,7 @@
             <a:fld id="{294A09A9-5501-47C1-A89A-A340965A2BE2}" type="slidenum">
               <a:rPr lang="en-US" smtClean="0"/>
               <a:pPr/>
-              <a:t>5</a:t>
+              <a:t>6</a:t>
             </a:fld>
             <a:endParaRPr lang="en-US" dirty="0"/>
           </a:p>
@@ -14781,7 +15250,7 @@
               <a:rPr lang="en-US" smtClean="0">
                 <a:latin typeface="+mn-lt"/>
               </a:rPr>
-              <a:t>24 October 2023</a:t>
+              <a:t>25 October 2023</a:t>
             </a:fld>
             <a:endParaRPr lang="en-US" dirty="0">
               <a:latin typeface="+mn-lt"/>
@@ -15044,7 +15513,7 @@
 </p:sld>
 </file>
 
-<file path=ppt/slides/slide6.xml><?xml version="1.0" encoding="utf-8"?>
+<file path=ppt/slides/slide7.xml><?xml version="1.0" encoding="utf-8"?>
 <p:sld xmlns:a="http://schemas.openxmlformats.org/drawingml/2006/main" xmlns:r="http://schemas.openxmlformats.org/officeDocument/2006/relationships" xmlns:p="http://schemas.openxmlformats.org/presentationml/2006/main">
   <p:cSld>
     <p:spTree>
@@ -15123,7 +15592,7 @@
             <a:fld id="{294A09A9-5501-47C1-A89A-A340965A2BE2}" type="slidenum">
               <a:rPr lang="en-US" smtClean="0"/>
               <a:pPr/>
-              <a:t>6</a:t>
+              <a:t>7</a:t>
             </a:fld>
             <a:endParaRPr lang="en-US" dirty="0"/>
           </a:p>
@@ -15154,7 +15623,7 @@
               <a:rPr lang="en-US" smtClean="0">
                 <a:latin typeface="+mn-lt"/>
               </a:rPr>
-              <a:t>24 October 2023</a:t>
+              <a:t>25 October 2023</a:t>
             </a:fld>
             <a:endParaRPr lang="en-US" dirty="0">
               <a:latin typeface="+mn-lt"/>
@@ -15362,7 +15831,7 @@
 </p:sld>
 </file>
 
-<file path=ppt/slides/slide7.xml><?xml version="1.0" encoding="utf-8"?>
+<file path=ppt/slides/slide8.xml><?xml version="1.0" encoding="utf-8"?>
 <p:sld xmlns:a="http://schemas.openxmlformats.org/drawingml/2006/main" xmlns:r="http://schemas.openxmlformats.org/officeDocument/2006/relationships" xmlns:p="http://schemas.openxmlformats.org/presentationml/2006/main">
   <p:cSld>
     <p:spTree>
@@ -15441,7 +15910,7 @@
             <a:fld id="{294A09A9-5501-47C1-A89A-A340965A2BE2}" type="slidenum">
               <a:rPr lang="en-US" smtClean="0"/>
               <a:pPr/>
-              <a:t>7</a:t>
+              <a:t>8</a:t>
             </a:fld>
             <a:endParaRPr lang="en-US" dirty="0"/>
           </a:p>
@@ -15472,7 +15941,7 @@
               <a:rPr lang="en-US" smtClean="0">
                 <a:latin typeface="+mn-lt"/>
               </a:rPr>
-              <a:t>24 October 2023</a:t>
+              <a:t>25 October 2023</a:t>
             </a:fld>
             <a:endParaRPr lang="en-US" dirty="0">
               <a:latin typeface="+mn-lt"/>
@@ -15535,6 +16004,41 @@
               </a:rPr>
               <a:t>Sign in with google</a:t>
             </a:r>
+          </a:p>
+          <a:p>
+            <a:pPr marL="893763" lvl="0" indent="-720725">
+              <a:lnSpc>
+                <a:spcPct val="115000"/>
+              </a:lnSpc>
+              <a:spcAft>
+                <a:spcPts val="800"/>
+              </a:spcAft>
+              <a:buFont typeface="Wingdings" panose="05000000000000000000" pitchFamily="2" charset="2"/>
+              <a:buChar char=""/>
+              <a:tabLst>
+                <a:tab pos="457200" algn="l"/>
+              </a:tabLst>
+            </a:pPr>
+            <a:r>
+              <a:rPr lang="en-GB" sz="2400" b="1" i="1" kern="100" dirty="0">
+                <a:solidFill>
+                  <a:srgbClr val="00B050"/>
+                </a:solidFill>
+                <a:latin typeface="Times New Roman" panose="02020603050405020304" pitchFamily="18" charset="0"/>
+                <a:ea typeface="Calibri" panose="020F0502020204030204" pitchFamily="34" charset="0"/>
+                <a:cs typeface="Times New Roman" panose="02020603050405020304" pitchFamily="18" charset="0"/>
+              </a:rPr>
+              <a:t>Forgot password with Gmail</a:t>
+            </a:r>
+            <a:endParaRPr lang="en-GB" sz="2400" b="1" i="1" kern="100" dirty="0">
+              <a:solidFill>
+                <a:srgbClr val="00B050"/>
+              </a:solidFill>
+              <a:effectLst/>
+              <a:latin typeface="Times New Roman" panose="02020603050405020304" pitchFamily="18" charset="0"/>
+              <a:ea typeface="Calibri" panose="020F0502020204030204" pitchFamily="34" charset="0"/>
+              <a:cs typeface="Times New Roman" panose="02020603050405020304" pitchFamily="18" charset="0"/>
+            </a:endParaRPr>
           </a:p>
           <a:p>
             <a:pPr marL="893763" lvl="0" indent="-720725">
@@ -15660,7 +16164,7 @@
 </p:sld>
 </file>
 
-<file path=ppt/slides/slide8.xml><?xml version="1.0" encoding="utf-8"?>
+<file path=ppt/slides/slide9.xml><?xml version="1.0" encoding="utf-8"?>
 <p:sld xmlns:a="http://schemas.openxmlformats.org/drawingml/2006/main" xmlns:r="http://schemas.openxmlformats.org/officeDocument/2006/relationships" xmlns:p="http://schemas.openxmlformats.org/presentationml/2006/main">
   <p:cSld>
     <p:spTree>
@@ -15739,7 +16243,7 @@
             <a:fld id="{294A09A9-5501-47C1-A89A-A340965A2BE2}" type="slidenum">
               <a:rPr lang="en-US" smtClean="0"/>
               <a:pPr/>
-              <a:t>8</a:t>
+              <a:t>9</a:t>
             </a:fld>
             <a:endParaRPr lang="en-US" dirty="0"/>
           </a:p>
@@ -15770,7 +16274,7 @@
               <a:rPr lang="en-US" smtClean="0">
                 <a:latin typeface="+mn-lt"/>
               </a:rPr>
-              <a:t>24 October 2023</a:t>
+              <a:t>25 October 2023</a:t>
             </a:fld>
             <a:endParaRPr lang="en-US" dirty="0">
               <a:latin typeface="+mn-lt"/>
@@ -16038,106 +16542,6 @@
     <p:extLst>
       <p:ext uri="{BB962C8B-B14F-4D97-AF65-F5344CB8AC3E}">
         <p14:creationId xmlns:p14="http://schemas.microsoft.com/office/powerpoint/2010/main" val="4098127886"/>
-      </p:ext>
-    </p:extLst>
-  </p:cSld>
-  <p:clrMapOvr>
-    <a:masterClrMapping/>
-  </p:clrMapOvr>
-</p:sld>
-</file>
-
-<file path=ppt/slides/slide9.xml><?xml version="1.0" encoding="utf-8"?>
-<p:sld xmlns:a="http://schemas.openxmlformats.org/drawingml/2006/main" xmlns:r="http://schemas.openxmlformats.org/officeDocument/2006/relationships" xmlns:p="http://schemas.openxmlformats.org/presentationml/2006/main">
-  <p:cSld>
-    <p:spTree>
-      <p:nvGrpSpPr>
-        <p:cNvPr id="1" name=""/>
-        <p:cNvGrpSpPr/>
-        <p:nvPr/>
-      </p:nvGrpSpPr>
-      <p:grpSpPr>
-        <a:xfrm>
-          <a:off x="0" y="0"/>
-          <a:ext cx="0" cy="0"/>
-          <a:chOff x="0" y="0"/>
-          <a:chExt cx="0" cy="0"/>
-        </a:xfrm>
-      </p:grpSpPr>
-      <p:sp>
-        <p:nvSpPr>
-          <p:cNvPr id="2" name="Title 1">
-            <a:extLst>
-              <a:ext uri="{FF2B5EF4-FFF2-40B4-BE49-F238E27FC236}">
-                <a16:creationId xmlns:a16="http://schemas.microsoft.com/office/drawing/2014/main" id="{51DF3D98-3C30-4CFC-8643-C81E829C8C25}"/>
-              </a:ext>
-            </a:extLst>
-          </p:cNvPr>
-          <p:cNvSpPr>
-            <a:spLocks noGrp="1"/>
-          </p:cNvSpPr>
-          <p:nvPr>
-            <p:ph type="title"/>
-          </p:nvPr>
-        </p:nvSpPr>
-        <p:spPr>
-          <a:xfrm>
-            <a:off x="6896100" y="398440"/>
-            <a:ext cx="4903377" cy="2386081"/>
-          </a:xfrm>
-        </p:spPr>
-        <p:txBody>
-          <a:bodyPr/>
-          <a:lstStyle/>
-          <a:p>
-            <a:r>
-              <a:rPr lang="en-US" dirty="0"/>
-              <a:t>Thank you</a:t>
-            </a:r>
-          </a:p>
-        </p:txBody>
-      </p:sp>
-      <p:pic>
-        <p:nvPicPr>
-          <p:cNvPr id="13" name="Picture Placeholder 12" descr="Person running up stairs">
-            <a:extLst>
-              <a:ext uri="{FF2B5EF4-FFF2-40B4-BE49-F238E27FC236}">
-                <a16:creationId xmlns:a16="http://schemas.microsoft.com/office/drawing/2014/main" id="{EC944911-7CDD-41CC-A7F0-5B0CF85D545C}"/>
-              </a:ext>
-              <a:ext uri="{C183D7F6-B498-43B3-948B-1728B52AA6E4}">
-                <adec:decorative xmlns:adec="http://schemas.microsoft.com/office/drawing/2017/decorative" val="0"/>
-              </a:ext>
-            </a:extLst>
-          </p:cNvPr>
-          <p:cNvPicPr>
-            <a:picLocks noGrp="1" noChangeAspect="1"/>
-          </p:cNvPicPr>
-          <p:nvPr>
-            <p:ph type="pic" sz="quarter" idx="13"/>
-          </p:nvPr>
-        </p:nvPicPr>
-        <p:blipFill>
-          <a:blip r:embed="rId3">
-            <a:extLst>
-              <a:ext uri="{28A0092B-C50C-407E-A947-70E740481C1C}">
-                <a14:useLocalDpi xmlns:a14="http://schemas.microsoft.com/office/drawing/2010/main" val="0"/>
-              </a:ext>
-            </a:extLst>
-          </a:blip>
-          <a:srcRect/>
-          <a:stretch/>
-        </p:blipFill>
-        <p:spPr>
-          <a:xfrm>
-            <a:off x="0" y="0"/>
-            <a:ext cx="6096000" cy="6858000"/>
-          </a:xfrm>
-        </p:spPr>
-      </p:pic>
-    </p:spTree>
-    <p:extLst>
-      <p:ext uri="{BB962C8B-B14F-4D97-AF65-F5344CB8AC3E}">
-        <p14:creationId xmlns:p14="http://schemas.microsoft.com/office/powerpoint/2010/main" val="2336677316"/>
       </p:ext>
     </p:extLst>
   </p:cSld>
@@ -16939,15 +17343,6 @@
 </file>
 
 <file path=customXml/item1.xml><?xml version="1.0" encoding="utf-8"?>
-<?mso-contentType ?>
-<FormTemplates xmlns="http://schemas.microsoft.com/sharepoint/v3/contenttype/forms">
-  <Display>DocumentLibraryForm</Display>
-  <Edit>DocumentLibraryForm</Edit>
-  <New>DocumentLibraryForm</New>
-</FormTemplates>
-</file>
-
-<file path=customXml/item2.xml><?xml version="1.0" encoding="utf-8"?>
 <p:properties xmlns:p="http://schemas.microsoft.com/office/2006/metadata/properties" xmlns:xsi="http://www.w3.org/2001/XMLSchema-instance" xmlns:pc="http://schemas.microsoft.com/office/infopath/2007/PartnerControls">
   <documentManagement>
     <_ip_UnifiedCompliancePolicyUIAction xmlns="http://schemas.microsoft.com/sharepoint/v3" xsi:nil="true"/>
@@ -16965,6 +17360,15 @@
     <MediaServiceKeyPoints xmlns="71af3243-3dd4-4a8d-8c0d-dd76da1f02a5" xsi:nil="true"/>
   </documentManagement>
 </p:properties>
+</file>
+
+<file path=customXml/item2.xml><?xml version="1.0" encoding="utf-8"?>
+<?mso-contentType ?>
+<FormTemplates xmlns="http://schemas.microsoft.com/sharepoint/v3/contenttype/forms">
+  <Display>DocumentLibraryForm</Display>
+  <Edit>DocumentLibraryForm</Edit>
+  <New>DocumentLibraryForm</New>
+</FormTemplates>
 </file>
 
 <file path=customXml/item3.xml><?xml version="1.0" encoding="utf-8"?>
@@ -17280,14 +17684,6 @@
 </file>
 
 <file path=customXml/itemProps1.xml><?xml version="1.0" encoding="utf-8"?>
-<ds:datastoreItem xmlns:ds="http://schemas.openxmlformats.org/officeDocument/2006/customXml" ds:itemID="{D5B334C4-64A2-4673-803C-35178659DDD3}">
-  <ds:schemaRefs>
-    <ds:schemaRef ds:uri="http://schemas.microsoft.com/sharepoint/v3/contenttype/forms"/>
-  </ds:schemaRefs>
-</ds:datastoreItem>
-</file>
-
-<file path=customXml/itemProps2.xml><?xml version="1.0" encoding="utf-8"?>
 <ds:datastoreItem xmlns:ds="http://schemas.openxmlformats.org/officeDocument/2006/customXml" ds:itemID="{3593354B-8927-46EE-B294-4D51952A09C2}">
   <ds:schemaRefs>
     <ds:schemaRef ds:uri="http://schemas.microsoft.com/office/2006/metadata/properties"/>
@@ -17295,6 +17691,14 @@
     <ds:schemaRef ds:uri="http://schemas.microsoft.com/sharepoint/v3"/>
     <ds:schemaRef ds:uri="71af3243-3dd4-4a8d-8c0d-dd76da1f02a5"/>
     <ds:schemaRef ds:uri="230e9df3-be65-4c73-a93b-d1236ebd677e"/>
+  </ds:schemaRefs>
+</ds:datastoreItem>
+</file>
+
+<file path=customXml/itemProps2.xml><?xml version="1.0" encoding="utf-8"?>
+<ds:datastoreItem xmlns:ds="http://schemas.openxmlformats.org/officeDocument/2006/customXml" ds:itemID="{D5B334C4-64A2-4673-803C-35178659DDD3}">
+  <ds:schemaRefs>
+    <ds:schemaRef ds:uri="http://schemas.microsoft.com/sharepoint/v3/contenttype/forms"/>
   </ds:schemaRefs>
 </ds:datastoreItem>
 </file>

</xml_diff>

<commit_message>
Revert "Updated presentation, payment, ccart_display"
This reverts commit 69748167ba3d7029968af79261a4e7a3f8e0ce93.
</commit_message>
<xml_diff>
--- a/Documents/Project.pptx
+++ b/Documents/Project.pptx
@@ -5,22 +5,21 @@
     <p:sldMasterId id="2147483658" r:id="rId4"/>
   </p:sldMasterIdLst>
   <p:notesMasterIdLst>
-    <p:notesMasterId r:id="rId15"/>
+    <p:notesMasterId r:id="rId14"/>
   </p:notesMasterIdLst>
   <p:handoutMasterIdLst>
-    <p:handoutMasterId r:id="rId16"/>
+    <p:handoutMasterId r:id="rId15"/>
   </p:handoutMasterIdLst>
   <p:sldIdLst>
     <p:sldId id="350" r:id="rId5"/>
-    <p:sldId id="369" r:id="rId6"/>
-    <p:sldId id="361" r:id="rId7"/>
-    <p:sldId id="357" r:id="rId8"/>
-    <p:sldId id="373" r:id="rId9"/>
-    <p:sldId id="370" r:id="rId10"/>
-    <p:sldId id="371" r:id="rId11"/>
-    <p:sldId id="372" r:id="rId12"/>
-    <p:sldId id="368" r:id="rId13"/>
-    <p:sldId id="343" r:id="rId14"/>
+    <p:sldId id="361" r:id="rId6"/>
+    <p:sldId id="357" r:id="rId7"/>
+    <p:sldId id="369" r:id="rId8"/>
+    <p:sldId id="370" r:id="rId9"/>
+    <p:sldId id="371" r:id="rId10"/>
+    <p:sldId id="372" r:id="rId11"/>
+    <p:sldId id="368" r:id="rId12"/>
+    <p:sldId id="343" r:id="rId13"/>
   </p:sldIdLst>
   <p:sldSz cx="12192000" cy="6858000"/>
   <p:notesSz cx="6858000" cy="9144000"/>
@@ -365,7 +364,7 @@
           <a:p>
             <a:fld id="{6EE7A52F-9D89-7442-A8E9-48D1527B5F6B}" type="datetimeFigureOut">
               <a:rPr lang="en-US" smtClean="0"/>
-              <a:t>10/25/2023</a:t>
+              <a:t>10/24/2023</a:t>
             </a:fld>
             <a:endParaRPr lang="en-US" dirty="0"/>
           </a:p>
@@ -781,7 +780,7 @@
           <a:p>
             <a:fld id="{A89C7E07-3C67-C64C-8DA0-0404F6303970}" type="slidenum">
               <a:rPr lang="en-US" smtClean="0"/>
-              <a:t>3</a:t>
+              <a:t>2</a:t>
             </a:fld>
             <a:endParaRPr lang="en-US" dirty="0"/>
           </a:p>
@@ -865,7 +864,7 @@
           <a:p>
             <a:fld id="{A89C7E07-3C67-C64C-8DA0-0404F6303970}" type="slidenum">
               <a:rPr lang="en-US" smtClean="0"/>
-              <a:t>10</a:t>
+              <a:t>9</a:t>
             </a:fld>
             <a:endParaRPr lang="en-US" dirty="0"/>
           </a:p>
@@ -2283,7 +2282,7 @@
               <a:rPr lang="en-US" smtClean="0">
                 <a:latin typeface="+mn-lt"/>
               </a:rPr>
-              <a:t>25 October 2023</a:t>
+              <a:t>24 October 2023</a:t>
             </a:fld>
             <a:endParaRPr lang="en-US" dirty="0">
               <a:latin typeface="+mn-lt"/>
@@ -3432,7 +3431,7 @@
               <a:rPr lang="en-US" smtClean="0">
                 <a:latin typeface="+mn-lt"/>
               </a:rPr>
-              <a:t>25 October 2023</a:t>
+              <a:t>24 October 2023</a:t>
             </a:fld>
             <a:endParaRPr lang="en-US" dirty="0">
               <a:latin typeface="+mn-lt"/>
@@ -4580,7 +4579,7 @@
               <a:rPr lang="en-US" smtClean="0">
                 <a:latin typeface="+mn-lt"/>
               </a:rPr>
-              <a:t>25 October 2023</a:t>
+              <a:t>24 October 2023</a:t>
             </a:fld>
             <a:endParaRPr lang="en-US" dirty="0">
               <a:latin typeface="+mn-lt"/>
@@ -6918,7 +6917,7 @@
               <a:rPr lang="en-US" smtClean="0">
                 <a:latin typeface="+mn-lt"/>
               </a:rPr>
-              <a:t>25 October 2023</a:t>
+              <a:t>24 October 2023</a:t>
             </a:fld>
             <a:endParaRPr lang="en-US" dirty="0">
               <a:latin typeface="+mn-lt"/>
@@ -7492,7 +7491,7 @@
               <a:rPr lang="en-US" smtClean="0">
                 <a:latin typeface="+mn-lt"/>
               </a:rPr>
-              <a:t>25 October 2023</a:t>
+              <a:t>24 October 2023</a:t>
             </a:fld>
             <a:endParaRPr lang="en-US" dirty="0">
               <a:latin typeface="+mn-lt"/>
@@ -8414,7 +8413,7 @@
               <a:rPr lang="en-US" smtClean="0">
                 <a:latin typeface="+mn-lt"/>
               </a:rPr>
-              <a:t>25 October 2023</a:t>
+              <a:t>24 October 2023</a:t>
             </a:fld>
             <a:endParaRPr lang="en-US" dirty="0">
               <a:latin typeface="+mn-lt"/>
@@ -8694,7 +8693,7 @@
               <a:rPr lang="en-US" smtClean="0">
                 <a:latin typeface="+mn-lt"/>
               </a:rPr>
-              <a:t>25 October 2023</a:t>
+              <a:t>24 October 2023</a:t>
             </a:fld>
             <a:endParaRPr lang="en-US" dirty="0">
               <a:latin typeface="+mn-lt"/>
@@ -11669,7 +11668,7 @@
               <a:rPr lang="en-US" smtClean="0">
                 <a:latin typeface="+mn-lt"/>
               </a:rPr>
-              <a:t>25 October 2023</a:t>
+              <a:t>24 October 2023</a:t>
             </a:fld>
             <a:endParaRPr lang="en-US" dirty="0">
               <a:latin typeface="+mn-lt"/>
@@ -12874,7 +12873,7 @@
               <a:rPr lang="en-US" smtClean="0">
                 <a:latin typeface="+mn-lt"/>
               </a:rPr>
-              <a:t>25 October 2023</a:t>
+              <a:t>24 October 2023</a:t>
             </a:fld>
             <a:endParaRPr lang="en-US" dirty="0">
               <a:latin typeface="+mn-lt"/>
@@ -13130,7 +13129,7 @@
               <a:rPr lang="en-US" smtClean="0">
                 <a:latin typeface="+mn-lt"/>
               </a:rPr>
-              <a:t>25 October 2023</a:t>
+              <a:t>24 October 2023</a:t>
             </a:fld>
             <a:endParaRPr lang="en-US" dirty="0">
               <a:latin typeface="+mn-lt"/>
@@ -13801,106 +13800,6 @@
 </p:sld>
 </file>
 
-<file path=ppt/slides/slide10.xml><?xml version="1.0" encoding="utf-8"?>
-<p:sld xmlns:a="http://schemas.openxmlformats.org/drawingml/2006/main" xmlns:r="http://schemas.openxmlformats.org/officeDocument/2006/relationships" xmlns:p="http://schemas.openxmlformats.org/presentationml/2006/main">
-  <p:cSld>
-    <p:spTree>
-      <p:nvGrpSpPr>
-        <p:cNvPr id="1" name=""/>
-        <p:cNvGrpSpPr/>
-        <p:nvPr/>
-      </p:nvGrpSpPr>
-      <p:grpSpPr>
-        <a:xfrm>
-          <a:off x="0" y="0"/>
-          <a:ext cx="0" cy="0"/>
-          <a:chOff x="0" y="0"/>
-          <a:chExt cx="0" cy="0"/>
-        </a:xfrm>
-      </p:grpSpPr>
-      <p:sp>
-        <p:nvSpPr>
-          <p:cNvPr id="2" name="Title 1">
-            <a:extLst>
-              <a:ext uri="{FF2B5EF4-FFF2-40B4-BE49-F238E27FC236}">
-                <a16:creationId xmlns:a16="http://schemas.microsoft.com/office/drawing/2014/main" id="{51DF3D98-3C30-4CFC-8643-C81E829C8C25}"/>
-              </a:ext>
-            </a:extLst>
-          </p:cNvPr>
-          <p:cNvSpPr>
-            <a:spLocks noGrp="1"/>
-          </p:cNvSpPr>
-          <p:nvPr>
-            <p:ph type="title"/>
-          </p:nvPr>
-        </p:nvSpPr>
-        <p:spPr>
-          <a:xfrm>
-            <a:off x="6896100" y="398440"/>
-            <a:ext cx="4903377" cy="2386081"/>
-          </a:xfrm>
-        </p:spPr>
-        <p:txBody>
-          <a:bodyPr/>
-          <a:lstStyle/>
-          <a:p>
-            <a:r>
-              <a:rPr lang="en-US" dirty="0"/>
-              <a:t>Thank you</a:t>
-            </a:r>
-          </a:p>
-        </p:txBody>
-      </p:sp>
-      <p:pic>
-        <p:nvPicPr>
-          <p:cNvPr id="13" name="Picture Placeholder 12" descr="Person running up stairs">
-            <a:extLst>
-              <a:ext uri="{FF2B5EF4-FFF2-40B4-BE49-F238E27FC236}">
-                <a16:creationId xmlns:a16="http://schemas.microsoft.com/office/drawing/2014/main" id="{EC944911-7CDD-41CC-A7F0-5B0CF85D545C}"/>
-              </a:ext>
-              <a:ext uri="{C183D7F6-B498-43B3-948B-1728B52AA6E4}">
-                <adec:decorative xmlns:adec="http://schemas.microsoft.com/office/drawing/2017/decorative" val="0"/>
-              </a:ext>
-            </a:extLst>
-          </p:cNvPr>
-          <p:cNvPicPr>
-            <a:picLocks noGrp="1" noChangeAspect="1"/>
-          </p:cNvPicPr>
-          <p:nvPr>
-            <p:ph type="pic" sz="quarter" idx="13"/>
-          </p:nvPr>
-        </p:nvPicPr>
-        <p:blipFill>
-          <a:blip r:embed="rId3">
-            <a:extLst>
-              <a:ext uri="{28A0092B-C50C-407E-A947-70E740481C1C}">
-                <a14:useLocalDpi xmlns:a14="http://schemas.microsoft.com/office/drawing/2010/main" val="0"/>
-              </a:ext>
-            </a:extLst>
-          </a:blip>
-          <a:srcRect/>
-          <a:stretch/>
-        </p:blipFill>
-        <p:spPr>
-          <a:xfrm>
-            <a:off x="0" y="0"/>
-            <a:ext cx="6096000" cy="6858000"/>
-          </a:xfrm>
-        </p:spPr>
-      </p:pic>
-    </p:spTree>
-    <p:extLst>
-      <p:ext uri="{BB962C8B-B14F-4D97-AF65-F5344CB8AC3E}">
-        <p14:creationId xmlns:p14="http://schemas.microsoft.com/office/powerpoint/2010/main" val="2336677316"/>
-      </p:ext>
-    </p:extLst>
-  </p:cSld>
-  <p:clrMapOvr>
-    <a:masterClrMapping/>
-  </p:clrMapOvr>
-</p:sld>
-</file>
-
 <file path=ppt/slides/slide2.xml><?xml version="1.0" encoding="utf-8"?>
 <p:sld xmlns:a="http://schemas.openxmlformats.org/drawingml/2006/main" xmlns:r="http://schemas.openxmlformats.org/officeDocument/2006/relationships" xmlns:p="http://schemas.openxmlformats.org/presentationml/2006/main">
   <p:cSld>
@@ -13920,10 +13819,10 @@
       </p:grpSpPr>
       <p:sp>
         <p:nvSpPr>
-          <p:cNvPr id="3" name="Title 2">
-            <a:extLst>
-              <a:ext uri="{FF2B5EF4-FFF2-40B4-BE49-F238E27FC236}">
-                <a16:creationId xmlns:a16="http://schemas.microsoft.com/office/drawing/2014/main" id="{01EB1D7F-284F-6F46-99FA-EBB8ED69D7EA}"/>
+          <p:cNvPr id="9" name="Title 8">
+            <a:extLst>
+              <a:ext uri="{FF2B5EF4-FFF2-40B4-BE49-F238E27FC236}">
+                <a16:creationId xmlns:a16="http://schemas.microsoft.com/office/drawing/2014/main" id="{0B06EEEB-3B0A-C5FF-0556-2418D262984D}"/>
               </a:ext>
             </a:extLst>
           </p:cNvPr>
@@ -13936,8 +13835,8 @@
         </p:nvSpPr>
         <p:spPr>
           <a:xfrm>
-            <a:off x="883920" y="506622"/>
-            <a:ext cx="10101579" cy="692256"/>
+            <a:off x="1233170" y="195538"/>
+            <a:ext cx="5970270" cy="1057829"/>
           </a:xfrm>
         </p:spPr>
         <p:txBody>
@@ -13946,17 +13845,17 @@
           <a:p>
             <a:r>
               <a:rPr lang="en-US" dirty="0"/>
-              <a:t>INDEX</a:t>
+              <a:t>INTRODUCTION </a:t>
             </a:r>
           </a:p>
         </p:txBody>
       </p:sp>
       <p:sp>
         <p:nvSpPr>
-          <p:cNvPr id="17" name="Slide Number Placeholder 16">
-            <a:extLst>
-              <a:ext uri="{FF2B5EF4-FFF2-40B4-BE49-F238E27FC236}">
-                <a16:creationId xmlns:a16="http://schemas.microsoft.com/office/drawing/2014/main" id="{32DA2B67-BDBB-C945-988B-6C0D86F697CE}"/>
+          <p:cNvPr id="7" name="Slide Number Placeholder 6">
+            <a:extLst>
+              <a:ext uri="{FF2B5EF4-FFF2-40B4-BE49-F238E27FC236}">
+                <a16:creationId xmlns:a16="http://schemas.microsoft.com/office/drawing/2014/main" id="{F37669F0-EA6D-6B46-AF0E-A9C2D1F223DB}"/>
               </a:ext>
             </a:extLst>
           </p:cNvPr>
@@ -13964,7 +13863,7 @@
             <a:spLocks noGrp="1"/>
           </p:cNvSpPr>
           <p:nvPr>
-            <p:ph type="sldNum" sz="quarter" idx="34"/>
+            <p:ph type="sldNum" sz="quarter" idx="16"/>
           </p:nvPr>
         </p:nvSpPr>
         <p:spPr>
@@ -13988,10 +13887,10 @@
       </p:sp>
       <p:sp>
         <p:nvSpPr>
-          <p:cNvPr id="4" name="Date Placeholder 3">
-            <a:extLst>
-              <a:ext uri="{FF2B5EF4-FFF2-40B4-BE49-F238E27FC236}">
-                <a16:creationId xmlns:a16="http://schemas.microsoft.com/office/drawing/2014/main" id="{9035E09D-D71E-2904-E048-C2FF9290B2BA}"/>
+          <p:cNvPr id="37" name="Date Placeholder 36">
+            <a:extLst>
+              <a:ext uri="{FF2B5EF4-FFF2-40B4-BE49-F238E27FC236}">
+                <a16:creationId xmlns:a16="http://schemas.microsoft.com/office/drawing/2014/main" id="{F4B2ECEF-8D19-DCB0-0C03-29B418379850}"/>
               </a:ext>
             </a:extLst>
           </p:cNvPr>
@@ -14002,29 +13901,30 @@
             <p:ph type="dt" sz="half" idx="2"/>
           </p:nvPr>
         </p:nvSpPr>
-        <p:spPr/>
+        <p:spPr>
+          <a:xfrm>
+            <a:off x="2992120" y="6332220"/>
+            <a:ext cx="1313180" cy="247651"/>
+          </a:xfrm>
+        </p:spPr>
         <p:txBody>
           <a:bodyPr/>
           <a:lstStyle/>
           <a:p>
-            <a:fld id="{CCC2975D-421E-48A1-B27B-6C94F7235AB6}" type="datetime3">
-              <a:rPr lang="en-US" smtClean="0">
-                <a:latin typeface="+mn-lt"/>
-              </a:rPr>
-              <a:t>25 October 2023</a:t>
+            <a:fld id="{D187F3CE-6D75-48DE-9E86-3286736E66E8}" type="datetime3">
+              <a:rPr lang="en-US" smtClean="0"/>
+              <a:t>24 October 2023</a:t>
             </a:fld>
-            <a:endParaRPr lang="en-US" dirty="0">
-              <a:latin typeface="+mn-lt"/>
-            </a:endParaRPr>
+            <a:endParaRPr lang="en-US" dirty="0"/>
           </a:p>
         </p:txBody>
       </p:sp>
       <p:sp>
         <p:nvSpPr>
-          <p:cNvPr id="15" name="Text Placeholder 14">
-            <a:extLst>
-              <a:ext uri="{FF2B5EF4-FFF2-40B4-BE49-F238E27FC236}">
-                <a16:creationId xmlns:a16="http://schemas.microsoft.com/office/drawing/2014/main" id="{811A84BE-40FE-6C3E-A3F7-E6EF1971A3B8}"/>
+          <p:cNvPr id="11" name="Text Placeholder 10">
+            <a:extLst>
+              <a:ext uri="{FF2B5EF4-FFF2-40B4-BE49-F238E27FC236}">
+                <a16:creationId xmlns:a16="http://schemas.microsoft.com/office/drawing/2014/main" id="{CC44239B-7197-71B4-1A8B-5003C2311538}"/>
               </a:ext>
             </a:extLst>
           </p:cNvPr>
@@ -14037,221 +13937,75 @@
         </p:nvSpPr>
         <p:spPr>
           <a:xfrm>
-            <a:off x="883920" y="1164589"/>
-            <a:ext cx="5669280" cy="4931411"/>
+            <a:off x="1233170" y="1604211"/>
+            <a:ext cx="10210800" cy="2891525"/>
           </a:xfrm>
           <a:solidFill>
             <a:schemeClr val="tx1">
-              <a:alpha val="80000"/>
+              <a:alpha val="87000"/>
             </a:schemeClr>
           </a:solidFill>
           <a:effectLst>
-            <a:softEdge rad="0"/>
+            <a:softEdge rad="63500"/>
           </a:effectLst>
         </p:spPr>
         <p:txBody>
-          <a:bodyPr/>
+          <a:bodyPr>
+            <a:noAutofit/>
+          </a:bodyPr>
           <a:lstStyle/>
           <a:p>
-            <a:pPr marL="893763" lvl="0" indent="-720725">
-              <a:lnSpc>
-                <a:spcPct val="115000"/>
-              </a:lnSpc>
-              <a:spcAft>
-                <a:spcPts val="800"/>
-              </a:spcAft>
-              <a:buFont typeface="Wingdings" panose="05000000000000000000" pitchFamily="2" charset="2"/>
-              <a:buChar char=""/>
-              <a:tabLst>
-                <a:tab pos="457200" algn="l"/>
-              </a:tabLst>
+            <a:pPr algn="just">
+              <a:buFont typeface="Arial" panose="020B0604020202020204" pitchFamily="34" charset="0"/>
+              <a:buChar char="•"/>
             </a:pPr>
             <a:r>
-              <a:rPr lang="en-GB" sz="2400" b="1" i="1" kern="100" dirty="0">
+              <a:rPr lang="en-GB" sz="2800" b="0" i="0" dirty="0">
                 <a:solidFill>
-                  <a:srgbClr val="00B050"/>
+                  <a:srgbClr val="374151"/>
                 </a:solidFill>
                 <a:effectLst/>
-                <a:latin typeface="Times New Roman" panose="02020603050405020304" pitchFamily="18" charset="0"/>
-                <a:ea typeface="Calibri" panose="020F0502020204030204" pitchFamily="34" charset="0"/>
-                <a:cs typeface="Times New Roman" panose="02020603050405020304" pitchFamily="18" charset="0"/>
+                <a:latin typeface="+mj-lt"/>
               </a:rPr>
-              <a:t>Introduction</a:t>
+              <a:t>In a dynamic world, "SwapZone" emerges as the game-changer in the e-commerce arena.</a:t>
             </a:r>
           </a:p>
           <a:p>
-            <a:pPr marL="893763" indent="-720725">
-              <a:lnSpc>
-                <a:spcPct val="115000"/>
-              </a:lnSpc>
-              <a:spcAft>
-                <a:spcPts val="800"/>
-              </a:spcAft>
-              <a:buFont typeface="Wingdings" panose="05000000000000000000" pitchFamily="2" charset="2"/>
-              <a:buChar char=""/>
-              <a:tabLst>
-                <a:tab pos="457200" algn="l"/>
-              </a:tabLst>
+            <a:pPr algn="just">
+              <a:buFont typeface="Arial" panose="020B0604020202020204" pitchFamily="34" charset="0"/>
+              <a:buChar char="•"/>
             </a:pPr>
             <a:r>
-              <a:rPr lang="en-GB" sz="2400" b="1" i="1" kern="100" dirty="0">
+              <a:rPr lang="en-GB" sz="2800" b="0" i="0" dirty="0">
                 <a:solidFill>
-                  <a:srgbClr val="00B050"/>
+                  <a:srgbClr val="374151"/>
                 </a:solidFill>
-                <a:latin typeface="Times New Roman" panose="02020603050405020304" pitchFamily="18" charset="0"/>
-                <a:ea typeface="Calibri" panose="020F0502020204030204" pitchFamily="34" charset="0"/>
-                <a:cs typeface="Times New Roman" panose="02020603050405020304" pitchFamily="18" charset="0"/>
+                <a:effectLst/>
+                <a:latin typeface="+mj-lt"/>
               </a:rPr>
-              <a:t>Users</a:t>
+              <a:t>Today, we'll embark on a journey through the heart of our project, exploring the innovative features of the Customer, Admin, and Seller modules.</a:t>
             </a:r>
           </a:p>
           <a:p>
-            <a:pPr marL="893763" indent="-720725">
-              <a:lnSpc>
-                <a:spcPct val="115000"/>
-              </a:lnSpc>
-              <a:spcAft>
-                <a:spcPts val="800"/>
-              </a:spcAft>
-              <a:buFont typeface="Wingdings" panose="05000000000000000000" pitchFamily="2" charset="2"/>
-              <a:buChar char=""/>
-              <a:tabLst>
-                <a:tab pos="457200" algn="l"/>
-              </a:tabLst>
+            <a:pPr algn="just">
+              <a:buFont typeface="Arial" panose="020B0604020202020204" pitchFamily="34" charset="0"/>
+              <a:buChar char="•"/>
             </a:pPr>
             <a:r>
-              <a:rPr lang="en-GB" sz="2400" b="1" i="1" kern="100" dirty="0">
+              <a:rPr lang="en-GB" sz="2800" b="0" i="0" dirty="0">
                 <a:solidFill>
-                  <a:srgbClr val="00B050"/>
+                  <a:srgbClr val="374151"/>
                 </a:solidFill>
                 <a:effectLst/>
-                <a:latin typeface="Times New Roman" panose="02020603050405020304" pitchFamily="18" charset="0"/>
-                <a:ea typeface="Calibri" panose="020F0502020204030204" pitchFamily="34" charset="0"/>
-                <a:cs typeface="Times New Roman" panose="02020603050405020304" pitchFamily="18" charset="0"/>
+                <a:latin typeface="+mj-lt"/>
               </a:rPr>
-              <a:t>Customer</a:t>
+              <a:t>SwapZone caters to the demands of modern consumers and tech-savvy sellers alike, offering a seamless experience from registration to sale analysis.</a:t>
             </a:r>
           </a:p>
           <a:p>
-            <a:pPr marL="893763" indent="-720725">
-              <a:lnSpc>
-                <a:spcPct val="115000"/>
-              </a:lnSpc>
-              <a:spcAft>
-                <a:spcPts val="800"/>
-              </a:spcAft>
-              <a:buFont typeface="Wingdings" panose="05000000000000000000" pitchFamily="2" charset="2"/>
-              <a:buChar char=""/>
-              <a:tabLst>
-                <a:tab pos="457200" algn="l"/>
-              </a:tabLst>
-            </a:pPr>
-            <a:r>
-              <a:rPr lang="en-GB" sz="2400" b="1" i="1" kern="100" dirty="0">
-                <a:solidFill>
-                  <a:srgbClr val="00B050"/>
-                </a:solidFill>
-                <a:latin typeface="Times New Roman" panose="02020603050405020304" pitchFamily="18" charset="0"/>
-                <a:ea typeface="Calibri" panose="020F0502020204030204" pitchFamily="34" charset="0"/>
-                <a:cs typeface="Times New Roman" panose="02020603050405020304" pitchFamily="18" charset="0"/>
-              </a:rPr>
-              <a:t>Admin</a:t>
-            </a:r>
-            <a:endParaRPr lang="en-GB" sz="2400" b="1" i="1" kern="100" dirty="0">
-              <a:solidFill>
-                <a:srgbClr val="00B050"/>
-              </a:solidFill>
-              <a:effectLst/>
-              <a:latin typeface="Times New Roman" panose="02020603050405020304" pitchFamily="18" charset="0"/>
-              <a:ea typeface="Calibri" panose="020F0502020204030204" pitchFamily="34" charset="0"/>
-              <a:cs typeface="Times New Roman" panose="02020603050405020304" pitchFamily="18" charset="0"/>
-            </a:endParaRPr>
-          </a:p>
-          <a:p>
-            <a:pPr marL="893763" indent="-720725">
-              <a:lnSpc>
-                <a:spcPct val="115000"/>
-              </a:lnSpc>
-              <a:spcAft>
-                <a:spcPts val="800"/>
-              </a:spcAft>
-              <a:buFont typeface="Wingdings" panose="05000000000000000000" pitchFamily="2" charset="2"/>
-              <a:buChar char=""/>
-              <a:tabLst>
-                <a:tab pos="457200" algn="l"/>
-              </a:tabLst>
-            </a:pPr>
-            <a:r>
-              <a:rPr lang="en-GB" sz="2400" b="1" i="1" kern="100" dirty="0">
-                <a:solidFill>
-                  <a:srgbClr val="00B050"/>
-                </a:solidFill>
-                <a:latin typeface="Times New Roman" panose="02020603050405020304" pitchFamily="18" charset="0"/>
-                <a:ea typeface="Calibri" panose="020F0502020204030204" pitchFamily="34" charset="0"/>
-                <a:cs typeface="Times New Roman" panose="02020603050405020304" pitchFamily="18" charset="0"/>
-              </a:rPr>
-              <a:t>Seller</a:t>
-            </a:r>
-          </a:p>
-          <a:p>
-            <a:pPr marL="893763" indent="-720725">
-              <a:lnSpc>
-                <a:spcPct val="115000"/>
-              </a:lnSpc>
-              <a:spcAft>
-                <a:spcPts val="800"/>
-              </a:spcAft>
-              <a:buFont typeface="Wingdings" panose="05000000000000000000" pitchFamily="2" charset="2"/>
-              <a:buChar char=""/>
-              <a:tabLst>
-                <a:tab pos="457200" algn="l"/>
-              </a:tabLst>
-            </a:pPr>
-            <a:r>
-              <a:rPr lang="en-GB" sz="2400" b="1" i="1" kern="100" dirty="0">
-                <a:solidFill>
-                  <a:srgbClr val="00B050"/>
-                </a:solidFill>
-                <a:latin typeface="Times New Roman" panose="02020603050405020304" pitchFamily="18" charset="0"/>
-                <a:ea typeface="Calibri" panose="020F0502020204030204" pitchFamily="34" charset="0"/>
-                <a:cs typeface="Times New Roman" panose="02020603050405020304" pitchFamily="18" charset="0"/>
-              </a:rPr>
-              <a:t>Technologies</a:t>
-            </a:r>
-          </a:p>
-          <a:p>
-            <a:pPr marL="893763" indent="-720725">
-              <a:lnSpc>
-                <a:spcPct val="115000"/>
-              </a:lnSpc>
-              <a:spcAft>
-                <a:spcPts val="800"/>
-              </a:spcAft>
-              <a:buFont typeface="Wingdings" panose="05000000000000000000" pitchFamily="2" charset="2"/>
-              <a:buChar char=""/>
-              <a:tabLst>
-                <a:tab pos="457200" algn="l"/>
-              </a:tabLst>
-            </a:pPr>
-            <a:r>
-              <a:rPr lang="en-GB" sz="2400" b="1" i="1" kern="100" dirty="0">
-                <a:solidFill>
-                  <a:srgbClr val="00B050"/>
-                </a:solidFill>
-                <a:latin typeface="Times New Roman" panose="02020603050405020304" pitchFamily="18" charset="0"/>
-                <a:ea typeface="Calibri" panose="020F0502020204030204" pitchFamily="34" charset="0"/>
-                <a:cs typeface="Times New Roman" panose="02020603050405020304" pitchFamily="18" charset="0"/>
-              </a:rPr>
-              <a:t>Future Scope</a:t>
-            </a:r>
-            <a:endParaRPr lang="en-GB" sz="2400" b="1" i="1" kern="100" dirty="0">
-              <a:solidFill>
-                <a:srgbClr val="00B050"/>
-              </a:solidFill>
-              <a:effectLst/>
-              <a:latin typeface="Times New Roman" panose="02020603050405020304" pitchFamily="18" charset="0"/>
-              <a:ea typeface="Calibri" panose="020F0502020204030204" pitchFamily="34" charset="0"/>
-              <a:cs typeface="Times New Roman" panose="02020603050405020304" pitchFamily="18" charset="0"/>
+            <a:pPr algn="just"/>
+            <a:endParaRPr lang="en-US" sz="2400" dirty="0">
+              <a:latin typeface="+mj-lt"/>
             </a:endParaRPr>
           </a:p>
         </p:txBody>
@@ -14259,7 +14013,7 @@
     </p:spTree>
     <p:extLst>
       <p:ext uri="{BB962C8B-B14F-4D97-AF65-F5344CB8AC3E}">
-        <p14:creationId xmlns:p14="http://schemas.microsoft.com/office/powerpoint/2010/main" val="3103488635"/>
+        <p14:creationId xmlns:p14="http://schemas.microsoft.com/office/powerpoint/2010/main" val="391246093"/>
       </p:ext>
     </p:extLst>
   </p:cSld>
@@ -14288,10 +14042,10 @@
       </p:grpSpPr>
       <p:sp>
         <p:nvSpPr>
-          <p:cNvPr id="9" name="Title 8">
-            <a:extLst>
-              <a:ext uri="{FF2B5EF4-FFF2-40B4-BE49-F238E27FC236}">
-                <a16:creationId xmlns:a16="http://schemas.microsoft.com/office/drawing/2014/main" id="{0B06EEEB-3B0A-C5FF-0556-2418D262984D}"/>
+          <p:cNvPr id="2" name="Title 1">
+            <a:extLst>
+              <a:ext uri="{FF2B5EF4-FFF2-40B4-BE49-F238E27FC236}">
+                <a16:creationId xmlns:a16="http://schemas.microsoft.com/office/drawing/2014/main" id="{00319620-6CCC-A34D-9D45-D6B57F800708}"/>
               </a:ext>
             </a:extLst>
           </p:cNvPr>
@@ -14304,8 +14058,8 @@
         </p:nvSpPr>
         <p:spPr>
           <a:xfrm>
-            <a:off x="1233170" y="195538"/>
-            <a:ext cx="5970270" cy="1057829"/>
+            <a:off x="964023" y="205247"/>
+            <a:ext cx="10169152" cy="1284679"/>
           </a:xfrm>
         </p:spPr>
         <p:txBody>
@@ -14314,17 +14068,17 @@
           <a:p>
             <a:r>
               <a:rPr lang="en-US" dirty="0"/>
-              <a:t>INTRODUCTION </a:t>
+              <a:t>Users</a:t>
             </a:r>
           </a:p>
         </p:txBody>
       </p:sp>
       <p:sp>
         <p:nvSpPr>
-          <p:cNvPr id="7" name="Slide Number Placeholder 6">
-            <a:extLst>
-              <a:ext uri="{FF2B5EF4-FFF2-40B4-BE49-F238E27FC236}">
-                <a16:creationId xmlns:a16="http://schemas.microsoft.com/office/drawing/2014/main" id="{F37669F0-EA6D-6B46-AF0E-A9C2D1F223DB}"/>
+          <p:cNvPr id="4" name="Text Placeholder 3">
+            <a:extLst>
+              <a:ext uri="{FF2B5EF4-FFF2-40B4-BE49-F238E27FC236}">
+                <a16:creationId xmlns:a16="http://schemas.microsoft.com/office/drawing/2014/main" id="{86655189-E7B2-3A4A-99EE-997592791F7D}"/>
               </a:ext>
             </a:extLst>
           </p:cNvPr>
@@ -14332,7 +14086,106 @@
             <a:spLocks noGrp="1"/>
           </p:cNvSpPr>
           <p:nvPr>
-            <p:ph type="sldNum" sz="quarter" idx="16"/>
+            <p:ph type="body" sz="quarter" idx="11"/>
+          </p:nvPr>
+        </p:nvSpPr>
+        <p:spPr>
+          <a:xfrm>
+            <a:off x="2171700" y="2721764"/>
+            <a:ext cx="2133600" cy="546841"/>
+          </a:xfrm>
+        </p:spPr>
+        <p:txBody>
+          <a:bodyPr/>
+          <a:lstStyle/>
+          <a:p>
+            <a:r>
+              <a:rPr lang="en-US" sz="3200" dirty="0"/>
+              <a:t>Customer</a:t>
+            </a:r>
+          </a:p>
+        </p:txBody>
+      </p:sp>
+      <p:sp>
+        <p:nvSpPr>
+          <p:cNvPr id="6" name="Text Placeholder 5">
+            <a:extLst>
+              <a:ext uri="{FF2B5EF4-FFF2-40B4-BE49-F238E27FC236}">
+                <a16:creationId xmlns:a16="http://schemas.microsoft.com/office/drawing/2014/main" id="{8D4284CF-DF13-E947-ADA5-0FD9AAC03C23}"/>
+              </a:ext>
+            </a:extLst>
+          </p:cNvPr>
+          <p:cNvSpPr>
+            <a:spLocks noGrp="1"/>
+          </p:cNvSpPr>
+          <p:nvPr>
+            <p:ph type="body" sz="quarter" idx="31"/>
+          </p:nvPr>
+        </p:nvSpPr>
+        <p:spPr>
+          <a:xfrm>
+            <a:off x="5624999" y="4666429"/>
+            <a:ext cx="2133600" cy="546841"/>
+          </a:xfrm>
+        </p:spPr>
+        <p:txBody>
+          <a:bodyPr/>
+          <a:lstStyle/>
+          <a:p>
+            <a:r>
+              <a:rPr lang="en-US" sz="3200" dirty="0"/>
+              <a:t>Seller</a:t>
+            </a:r>
+          </a:p>
+        </p:txBody>
+      </p:sp>
+      <p:sp>
+        <p:nvSpPr>
+          <p:cNvPr id="10" name="Text Placeholder 9">
+            <a:extLst>
+              <a:ext uri="{FF2B5EF4-FFF2-40B4-BE49-F238E27FC236}">
+                <a16:creationId xmlns:a16="http://schemas.microsoft.com/office/drawing/2014/main" id="{9C396C20-F6DF-C940-BE16-6E008BFF9CB9}"/>
+              </a:ext>
+            </a:extLst>
+          </p:cNvPr>
+          <p:cNvSpPr>
+            <a:spLocks noGrp="1"/>
+          </p:cNvSpPr>
+          <p:nvPr>
+            <p:ph type="body" sz="quarter" idx="35"/>
+          </p:nvPr>
+        </p:nvSpPr>
+        <p:spPr>
+          <a:xfrm>
+            <a:off x="7586222" y="2721763"/>
+            <a:ext cx="2675377" cy="546841"/>
+          </a:xfrm>
+        </p:spPr>
+        <p:txBody>
+          <a:bodyPr/>
+          <a:lstStyle/>
+          <a:p>
+            <a:r>
+              <a:rPr lang="en-US" sz="3200" dirty="0"/>
+              <a:t>Administrator</a:t>
+            </a:r>
+          </a:p>
+        </p:txBody>
+      </p:sp>
+      <p:sp>
+        <p:nvSpPr>
+          <p:cNvPr id="13" name="Slide Number Placeholder 12">
+            <a:extLst>
+              <a:ext uri="{FF2B5EF4-FFF2-40B4-BE49-F238E27FC236}">
+                <a16:creationId xmlns:a16="http://schemas.microsoft.com/office/drawing/2014/main" id="{B2B0E625-26CC-9744-9B92-56905E797B65}"/>
+              </a:ext>
+            </a:extLst>
+          </p:cNvPr>
+          <p:cNvSpPr>
+            <a:spLocks noGrp="1"/>
+          </p:cNvSpPr>
+          <p:nvPr>
+            <p:ph type="sldNum" sz="quarter" idx="38"/>
           </p:nvPr>
         </p:nvSpPr>
         <p:spPr>
@@ -14356,10 +14209,10 @@
       </p:sp>
       <p:sp>
         <p:nvSpPr>
-          <p:cNvPr id="37" name="Date Placeholder 36">
-            <a:extLst>
-              <a:ext uri="{FF2B5EF4-FFF2-40B4-BE49-F238E27FC236}">
-                <a16:creationId xmlns:a16="http://schemas.microsoft.com/office/drawing/2014/main" id="{F4B2ECEF-8D19-DCB0-0C03-29B418379850}"/>
+          <p:cNvPr id="14" name="Date Placeholder 13">
+            <a:extLst>
+              <a:ext uri="{FF2B5EF4-FFF2-40B4-BE49-F238E27FC236}">
+                <a16:creationId xmlns:a16="http://schemas.microsoft.com/office/drawing/2014/main" id="{3148458E-E475-67C0-76EE-E966A9615AC4}"/>
               </a:ext>
             </a:extLst>
           </p:cNvPr>
@@ -14370,111 +14223,19 @@
             <p:ph type="dt" sz="half" idx="2"/>
           </p:nvPr>
         </p:nvSpPr>
-        <p:spPr>
-          <a:xfrm>
-            <a:off x="2992120" y="6332220"/>
-            <a:ext cx="1313180" cy="247651"/>
-          </a:xfrm>
-        </p:spPr>
+        <p:spPr/>
         <p:txBody>
           <a:bodyPr/>
           <a:lstStyle/>
           <a:p>
-            <a:fld id="{D187F3CE-6D75-48DE-9E86-3286736E66E8}" type="datetime3">
-              <a:rPr lang="en-US" smtClean="0"/>
-              <a:t>25 October 2023</a:t>
+            <a:fld id="{B37174CB-6E65-49C6-A2EE-3CC8F1772E5D}" type="datetime3">
+              <a:rPr lang="en-US" smtClean="0">
+                <a:latin typeface="+mn-lt"/>
+              </a:rPr>
+              <a:t>24 October 2023</a:t>
             </a:fld>
-            <a:endParaRPr lang="en-US" dirty="0"/>
-          </a:p>
-        </p:txBody>
-      </p:sp>
-      <p:sp>
-        <p:nvSpPr>
-          <p:cNvPr id="11" name="Text Placeholder 10">
-            <a:extLst>
-              <a:ext uri="{FF2B5EF4-FFF2-40B4-BE49-F238E27FC236}">
-                <a16:creationId xmlns:a16="http://schemas.microsoft.com/office/drawing/2014/main" id="{CC44239B-7197-71B4-1A8B-5003C2311538}"/>
-              </a:ext>
-            </a:extLst>
-          </p:cNvPr>
-          <p:cNvSpPr>
-            <a:spLocks noGrp="1"/>
-          </p:cNvSpPr>
-          <p:nvPr>
-            <p:ph type="body" sz="quarter" idx="11"/>
-          </p:nvPr>
-        </p:nvSpPr>
-        <p:spPr>
-          <a:xfrm>
-            <a:off x="1233170" y="1604211"/>
-            <a:ext cx="10210800" cy="2891525"/>
-          </a:xfrm>
-          <a:solidFill>
-            <a:schemeClr val="tx1">
-              <a:alpha val="87000"/>
-            </a:schemeClr>
-          </a:solidFill>
-          <a:effectLst>
-            <a:softEdge rad="63500"/>
-          </a:effectLst>
-        </p:spPr>
-        <p:txBody>
-          <a:bodyPr>
-            <a:noAutofit/>
-          </a:bodyPr>
-          <a:lstStyle/>
-          <a:p>
-            <a:pPr algn="just">
-              <a:buFont typeface="Arial" panose="020B0604020202020204" pitchFamily="34" charset="0"/>
-              <a:buChar char="•"/>
-            </a:pPr>
-            <a:r>
-              <a:rPr lang="en-GB" sz="2800" b="0" i="0" dirty="0">
-                <a:solidFill>
-                  <a:srgbClr val="374151"/>
-                </a:solidFill>
-                <a:effectLst/>
-                <a:latin typeface="+mj-lt"/>
-              </a:rPr>
-              <a:t>In a dynamic world, "SwapZone" emerges as the game-changer in the e-commerce arena.</a:t>
-            </a:r>
-          </a:p>
-          <a:p>
-            <a:pPr algn="just">
-              <a:buFont typeface="Arial" panose="020B0604020202020204" pitchFamily="34" charset="0"/>
-              <a:buChar char="•"/>
-            </a:pPr>
-            <a:r>
-              <a:rPr lang="en-GB" sz="2800" b="0" i="0" dirty="0">
-                <a:solidFill>
-                  <a:srgbClr val="374151"/>
-                </a:solidFill>
-                <a:effectLst/>
-                <a:latin typeface="+mj-lt"/>
-              </a:rPr>
-              <a:t>Today, we'll embark on a journey through the heart of our project, exploring the innovative features of the Customer, Admin, and Seller modules.</a:t>
-            </a:r>
-          </a:p>
-          <a:p>
-            <a:pPr algn="just">
-              <a:buFont typeface="Arial" panose="020B0604020202020204" pitchFamily="34" charset="0"/>
-              <a:buChar char="•"/>
-            </a:pPr>
-            <a:r>
-              <a:rPr lang="en-GB" sz="2800" b="0" i="0" dirty="0">
-                <a:solidFill>
-                  <a:srgbClr val="374151"/>
-                </a:solidFill>
-                <a:effectLst/>
-                <a:latin typeface="+mj-lt"/>
-              </a:rPr>
-              <a:t>SwapZone caters to the demands of modern consumers and tech-savvy sellers alike, offering a seamless experience from registration to sale analysis.</a:t>
-            </a:r>
-          </a:p>
-          <a:p>
-            <a:pPr algn="just"/>
-            <a:endParaRPr lang="en-US" sz="2400" dirty="0">
-              <a:latin typeface="+mj-lt"/>
+            <a:endParaRPr lang="en-US" dirty="0">
+              <a:latin typeface="+mn-lt"/>
             </a:endParaRPr>
           </a:p>
         </p:txBody>
@@ -14482,7 +14243,7 @@
     </p:spTree>
     <p:extLst>
       <p:ext uri="{BB962C8B-B14F-4D97-AF65-F5344CB8AC3E}">
-        <p14:creationId xmlns:p14="http://schemas.microsoft.com/office/powerpoint/2010/main" val="391246093"/>
+        <p14:creationId xmlns:p14="http://schemas.microsoft.com/office/powerpoint/2010/main" val="2509101887"/>
       </p:ext>
     </p:extLst>
   </p:cSld>
@@ -14511,236 +14272,6 @@
       </p:grpSpPr>
       <p:sp>
         <p:nvSpPr>
-          <p:cNvPr id="2" name="Title 1">
-            <a:extLst>
-              <a:ext uri="{FF2B5EF4-FFF2-40B4-BE49-F238E27FC236}">
-                <a16:creationId xmlns:a16="http://schemas.microsoft.com/office/drawing/2014/main" id="{00319620-6CCC-A34D-9D45-D6B57F800708}"/>
-              </a:ext>
-            </a:extLst>
-          </p:cNvPr>
-          <p:cNvSpPr>
-            <a:spLocks noGrp="1"/>
-          </p:cNvSpPr>
-          <p:nvPr>
-            <p:ph type="title"/>
-          </p:nvPr>
-        </p:nvSpPr>
-        <p:spPr>
-          <a:xfrm>
-            <a:off x="964023" y="205247"/>
-            <a:ext cx="10169152" cy="1284679"/>
-          </a:xfrm>
-        </p:spPr>
-        <p:txBody>
-          <a:bodyPr/>
-          <a:lstStyle/>
-          <a:p>
-            <a:r>
-              <a:rPr lang="en-US" dirty="0"/>
-              <a:t>Users</a:t>
-            </a:r>
-          </a:p>
-        </p:txBody>
-      </p:sp>
-      <p:sp>
-        <p:nvSpPr>
-          <p:cNvPr id="4" name="Text Placeholder 3">
-            <a:extLst>
-              <a:ext uri="{FF2B5EF4-FFF2-40B4-BE49-F238E27FC236}">
-                <a16:creationId xmlns:a16="http://schemas.microsoft.com/office/drawing/2014/main" id="{86655189-E7B2-3A4A-99EE-997592791F7D}"/>
-              </a:ext>
-            </a:extLst>
-          </p:cNvPr>
-          <p:cNvSpPr>
-            <a:spLocks noGrp="1"/>
-          </p:cNvSpPr>
-          <p:nvPr>
-            <p:ph type="body" sz="quarter" idx="11"/>
-          </p:nvPr>
-        </p:nvSpPr>
-        <p:spPr>
-          <a:xfrm>
-            <a:off x="2171700" y="2721764"/>
-            <a:ext cx="2133600" cy="546841"/>
-          </a:xfrm>
-        </p:spPr>
-        <p:txBody>
-          <a:bodyPr/>
-          <a:lstStyle/>
-          <a:p>
-            <a:r>
-              <a:rPr lang="en-US" sz="3200" dirty="0"/>
-              <a:t>Customer</a:t>
-            </a:r>
-          </a:p>
-        </p:txBody>
-      </p:sp>
-      <p:sp>
-        <p:nvSpPr>
-          <p:cNvPr id="6" name="Text Placeholder 5">
-            <a:extLst>
-              <a:ext uri="{FF2B5EF4-FFF2-40B4-BE49-F238E27FC236}">
-                <a16:creationId xmlns:a16="http://schemas.microsoft.com/office/drawing/2014/main" id="{8D4284CF-DF13-E947-ADA5-0FD9AAC03C23}"/>
-              </a:ext>
-            </a:extLst>
-          </p:cNvPr>
-          <p:cNvSpPr>
-            <a:spLocks noGrp="1"/>
-          </p:cNvSpPr>
-          <p:nvPr>
-            <p:ph type="body" sz="quarter" idx="31"/>
-          </p:nvPr>
-        </p:nvSpPr>
-        <p:spPr>
-          <a:xfrm>
-            <a:off x="5624999" y="4666429"/>
-            <a:ext cx="2133600" cy="546841"/>
-          </a:xfrm>
-        </p:spPr>
-        <p:txBody>
-          <a:bodyPr/>
-          <a:lstStyle/>
-          <a:p>
-            <a:r>
-              <a:rPr lang="en-US" sz="3200" dirty="0"/>
-              <a:t>Seller</a:t>
-            </a:r>
-          </a:p>
-        </p:txBody>
-      </p:sp>
-      <p:sp>
-        <p:nvSpPr>
-          <p:cNvPr id="10" name="Text Placeholder 9">
-            <a:extLst>
-              <a:ext uri="{FF2B5EF4-FFF2-40B4-BE49-F238E27FC236}">
-                <a16:creationId xmlns:a16="http://schemas.microsoft.com/office/drawing/2014/main" id="{9C396C20-F6DF-C940-BE16-6E008BFF9CB9}"/>
-              </a:ext>
-            </a:extLst>
-          </p:cNvPr>
-          <p:cNvSpPr>
-            <a:spLocks noGrp="1"/>
-          </p:cNvSpPr>
-          <p:nvPr>
-            <p:ph type="body" sz="quarter" idx="35"/>
-          </p:nvPr>
-        </p:nvSpPr>
-        <p:spPr>
-          <a:xfrm>
-            <a:off x="7586222" y="2721763"/>
-            <a:ext cx="2675377" cy="546841"/>
-          </a:xfrm>
-        </p:spPr>
-        <p:txBody>
-          <a:bodyPr/>
-          <a:lstStyle/>
-          <a:p>
-            <a:r>
-              <a:rPr lang="en-US" sz="3200" dirty="0"/>
-              <a:t>Administrator</a:t>
-            </a:r>
-          </a:p>
-        </p:txBody>
-      </p:sp>
-      <p:sp>
-        <p:nvSpPr>
-          <p:cNvPr id="13" name="Slide Number Placeholder 12">
-            <a:extLst>
-              <a:ext uri="{FF2B5EF4-FFF2-40B4-BE49-F238E27FC236}">
-                <a16:creationId xmlns:a16="http://schemas.microsoft.com/office/drawing/2014/main" id="{B2B0E625-26CC-9744-9B92-56905E797B65}"/>
-              </a:ext>
-            </a:extLst>
-          </p:cNvPr>
-          <p:cNvSpPr>
-            <a:spLocks noGrp="1"/>
-          </p:cNvSpPr>
-          <p:nvPr>
-            <p:ph type="sldNum" sz="quarter" idx="38"/>
-          </p:nvPr>
-        </p:nvSpPr>
-        <p:spPr>
-          <a:xfrm>
-            <a:off x="971550" y="6332220"/>
-            <a:ext cx="523240" cy="247651"/>
-          </a:xfrm>
-        </p:spPr>
-        <p:txBody>
-          <a:bodyPr/>
-          <a:lstStyle/>
-          <a:p>
-            <a:fld id="{294A09A9-5501-47C1-A89A-A340965A2BE2}" type="slidenum">
-              <a:rPr lang="en-US" smtClean="0"/>
-              <a:pPr/>
-              <a:t>4</a:t>
-            </a:fld>
-            <a:endParaRPr lang="en-US" dirty="0"/>
-          </a:p>
-        </p:txBody>
-      </p:sp>
-      <p:sp>
-        <p:nvSpPr>
-          <p:cNvPr id="14" name="Date Placeholder 13">
-            <a:extLst>
-              <a:ext uri="{FF2B5EF4-FFF2-40B4-BE49-F238E27FC236}">
-                <a16:creationId xmlns:a16="http://schemas.microsoft.com/office/drawing/2014/main" id="{3148458E-E475-67C0-76EE-E966A9615AC4}"/>
-              </a:ext>
-            </a:extLst>
-          </p:cNvPr>
-          <p:cNvSpPr>
-            <a:spLocks noGrp="1"/>
-          </p:cNvSpPr>
-          <p:nvPr>
-            <p:ph type="dt" sz="half" idx="2"/>
-          </p:nvPr>
-        </p:nvSpPr>
-        <p:spPr/>
-        <p:txBody>
-          <a:bodyPr/>
-          <a:lstStyle/>
-          <a:p>
-            <a:fld id="{B37174CB-6E65-49C6-A2EE-3CC8F1772E5D}" type="datetime3">
-              <a:rPr lang="en-US" smtClean="0">
-                <a:latin typeface="+mn-lt"/>
-              </a:rPr>
-              <a:t>25 October 2023</a:t>
-            </a:fld>
-            <a:endParaRPr lang="en-US" dirty="0">
-              <a:latin typeface="+mn-lt"/>
-            </a:endParaRPr>
-          </a:p>
-        </p:txBody>
-      </p:sp>
-    </p:spTree>
-    <p:extLst>
-      <p:ext uri="{BB962C8B-B14F-4D97-AF65-F5344CB8AC3E}">
-        <p14:creationId xmlns:p14="http://schemas.microsoft.com/office/powerpoint/2010/main" val="2509101887"/>
-      </p:ext>
-    </p:extLst>
-  </p:cSld>
-  <p:clrMapOvr>
-    <a:masterClrMapping/>
-  </p:clrMapOvr>
-</p:sld>
-</file>
-
-<file path=ppt/slides/slide5.xml><?xml version="1.0" encoding="utf-8"?>
-<p:sld xmlns:a="http://schemas.openxmlformats.org/drawingml/2006/main" xmlns:r="http://schemas.openxmlformats.org/officeDocument/2006/relationships" xmlns:p="http://schemas.openxmlformats.org/presentationml/2006/main">
-  <p:cSld>
-    <p:spTree>
-      <p:nvGrpSpPr>
-        <p:cNvPr id="1" name=""/>
-        <p:cNvGrpSpPr/>
-        <p:nvPr/>
-      </p:nvGrpSpPr>
-      <p:grpSpPr>
-        <a:xfrm>
-          <a:off x="0" y="0"/>
-          <a:ext cx="0" cy="0"/>
-          <a:chOff x="0" y="0"/>
-          <a:chExt cx="0" cy="0"/>
-        </a:xfrm>
-      </p:grpSpPr>
-      <p:sp>
-        <p:nvSpPr>
           <p:cNvPr id="3" name="Title 2">
             <a:extLst>
               <a:ext uri="{FF2B5EF4-FFF2-40B4-BE49-F238E27FC236}">
@@ -14801,7 +14332,7 @@
             <a:fld id="{294A09A9-5501-47C1-A89A-A340965A2BE2}" type="slidenum">
               <a:rPr lang="en-US" smtClean="0"/>
               <a:pPr/>
-              <a:t>5</a:t>
+              <a:t>4</a:t>
             </a:fld>
             <a:endParaRPr lang="en-US" dirty="0"/>
           </a:p>
@@ -14832,7 +14363,7 @@
               <a:rPr lang="en-US" smtClean="0">
                 <a:latin typeface="+mn-lt"/>
               </a:rPr>
-              <a:t>25 October 2023</a:t>
+              <a:t>24 October 2023</a:t>
             </a:fld>
             <a:endParaRPr lang="en-US" dirty="0">
               <a:latin typeface="+mn-lt"/>
@@ -15130,7 +14661,7 @@
     </p:spTree>
     <p:extLst>
       <p:ext uri="{BB962C8B-B14F-4D97-AF65-F5344CB8AC3E}">
-        <p14:creationId xmlns:p14="http://schemas.microsoft.com/office/powerpoint/2010/main" val="1107694493"/>
+        <p14:creationId xmlns:p14="http://schemas.microsoft.com/office/powerpoint/2010/main" val="3103488635"/>
       </p:ext>
     </p:extLst>
   </p:cSld>
@@ -15140,7 +14671,7 @@
 </p:sld>
 </file>
 
-<file path=ppt/slides/slide6.xml><?xml version="1.0" encoding="utf-8"?>
+<file path=ppt/slides/slide5.xml><?xml version="1.0" encoding="utf-8"?>
 <p:sld xmlns:a="http://schemas.openxmlformats.org/drawingml/2006/main" xmlns:r="http://schemas.openxmlformats.org/officeDocument/2006/relationships" xmlns:p="http://schemas.openxmlformats.org/presentationml/2006/main">
   <p:cSld>
     <p:spTree>
@@ -15219,7 +14750,7 @@
             <a:fld id="{294A09A9-5501-47C1-A89A-A340965A2BE2}" type="slidenum">
               <a:rPr lang="en-US" smtClean="0"/>
               <a:pPr/>
-              <a:t>6</a:t>
+              <a:t>5</a:t>
             </a:fld>
             <a:endParaRPr lang="en-US" dirty="0"/>
           </a:p>
@@ -15250,7 +14781,7 @@
               <a:rPr lang="en-US" smtClean="0">
                 <a:latin typeface="+mn-lt"/>
               </a:rPr>
-              <a:t>25 October 2023</a:t>
+              <a:t>24 October 2023</a:t>
             </a:fld>
             <a:endParaRPr lang="en-US" dirty="0">
               <a:latin typeface="+mn-lt"/>
@@ -15513,7 +15044,7 @@
 </p:sld>
 </file>
 
-<file path=ppt/slides/slide7.xml><?xml version="1.0" encoding="utf-8"?>
+<file path=ppt/slides/slide6.xml><?xml version="1.0" encoding="utf-8"?>
 <p:sld xmlns:a="http://schemas.openxmlformats.org/drawingml/2006/main" xmlns:r="http://schemas.openxmlformats.org/officeDocument/2006/relationships" xmlns:p="http://schemas.openxmlformats.org/presentationml/2006/main">
   <p:cSld>
     <p:spTree>
@@ -15592,7 +15123,7 @@
             <a:fld id="{294A09A9-5501-47C1-A89A-A340965A2BE2}" type="slidenum">
               <a:rPr lang="en-US" smtClean="0"/>
               <a:pPr/>
-              <a:t>7</a:t>
+              <a:t>6</a:t>
             </a:fld>
             <a:endParaRPr lang="en-US" dirty="0"/>
           </a:p>
@@ -15623,7 +15154,7 @@
               <a:rPr lang="en-US" smtClean="0">
                 <a:latin typeface="+mn-lt"/>
               </a:rPr>
-              <a:t>25 October 2023</a:t>
+              <a:t>24 October 2023</a:t>
             </a:fld>
             <a:endParaRPr lang="en-US" dirty="0">
               <a:latin typeface="+mn-lt"/>
@@ -15831,7 +15362,7 @@
 </p:sld>
 </file>
 
-<file path=ppt/slides/slide8.xml><?xml version="1.0" encoding="utf-8"?>
+<file path=ppt/slides/slide7.xml><?xml version="1.0" encoding="utf-8"?>
 <p:sld xmlns:a="http://schemas.openxmlformats.org/drawingml/2006/main" xmlns:r="http://schemas.openxmlformats.org/officeDocument/2006/relationships" xmlns:p="http://schemas.openxmlformats.org/presentationml/2006/main">
   <p:cSld>
     <p:spTree>
@@ -15910,7 +15441,7 @@
             <a:fld id="{294A09A9-5501-47C1-A89A-A340965A2BE2}" type="slidenum">
               <a:rPr lang="en-US" smtClean="0"/>
               <a:pPr/>
-              <a:t>8</a:t>
+              <a:t>7</a:t>
             </a:fld>
             <a:endParaRPr lang="en-US" dirty="0"/>
           </a:p>
@@ -15941,7 +15472,7 @@
               <a:rPr lang="en-US" smtClean="0">
                 <a:latin typeface="+mn-lt"/>
               </a:rPr>
-              <a:t>25 October 2023</a:t>
+              <a:t>24 October 2023</a:t>
             </a:fld>
             <a:endParaRPr lang="en-US" dirty="0">
               <a:latin typeface="+mn-lt"/>
@@ -16004,41 +15535,6 @@
               </a:rPr>
               <a:t>Sign in with google</a:t>
             </a:r>
-          </a:p>
-          <a:p>
-            <a:pPr marL="893763" lvl="0" indent="-720725">
-              <a:lnSpc>
-                <a:spcPct val="115000"/>
-              </a:lnSpc>
-              <a:spcAft>
-                <a:spcPts val="800"/>
-              </a:spcAft>
-              <a:buFont typeface="Wingdings" panose="05000000000000000000" pitchFamily="2" charset="2"/>
-              <a:buChar char=""/>
-              <a:tabLst>
-                <a:tab pos="457200" algn="l"/>
-              </a:tabLst>
-            </a:pPr>
-            <a:r>
-              <a:rPr lang="en-GB" sz="2400" b="1" i="1" kern="100" dirty="0">
-                <a:solidFill>
-                  <a:srgbClr val="00B050"/>
-                </a:solidFill>
-                <a:latin typeface="Times New Roman" panose="02020603050405020304" pitchFamily="18" charset="0"/>
-                <a:ea typeface="Calibri" panose="020F0502020204030204" pitchFamily="34" charset="0"/>
-                <a:cs typeface="Times New Roman" panose="02020603050405020304" pitchFamily="18" charset="0"/>
-              </a:rPr>
-              <a:t>Forgot password with Gmail</a:t>
-            </a:r>
-            <a:endParaRPr lang="en-GB" sz="2400" b="1" i="1" kern="100" dirty="0">
-              <a:solidFill>
-                <a:srgbClr val="00B050"/>
-              </a:solidFill>
-              <a:effectLst/>
-              <a:latin typeface="Times New Roman" panose="02020603050405020304" pitchFamily="18" charset="0"/>
-              <a:ea typeface="Calibri" panose="020F0502020204030204" pitchFamily="34" charset="0"/>
-              <a:cs typeface="Times New Roman" panose="02020603050405020304" pitchFamily="18" charset="0"/>
-            </a:endParaRPr>
           </a:p>
           <a:p>
             <a:pPr marL="893763" lvl="0" indent="-720725">
@@ -16164,7 +15660,7 @@
 </p:sld>
 </file>
 
-<file path=ppt/slides/slide9.xml><?xml version="1.0" encoding="utf-8"?>
+<file path=ppt/slides/slide8.xml><?xml version="1.0" encoding="utf-8"?>
 <p:sld xmlns:a="http://schemas.openxmlformats.org/drawingml/2006/main" xmlns:r="http://schemas.openxmlformats.org/officeDocument/2006/relationships" xmlns:p="http://schemas.openxmlformats.org/presentationml/2006/main">
   <p:cSld>
     <p:spTree>
@@ -16243,7 +15739,7 @@
             <a:fld id="{294A09A9-5501-47C1-A89A-A340965A2BE2}" type="slidenum">
               <a:rPr lang="en-US" smtClean="0"/>
               <a:pPr/>
-              <a:t>9</a:t>
+              <a:t>8</a:t>
             </a:fld>
             <a:endParaRPr lang="en-US" dirty="0"/>
           </a:p>
@@ -16274,7 +15770,7 @@
               <a:rPr lang="en-US" smtClean="0">
                 <a:latin typeface="+mn-lt"/>
               </a:rPr>
-              <a:t>25 October 2023</a:t>
+              <a:t>24 October 2023</a:t>
             </a:fld>
             <a:endParaRPr lang="en-US" dirty="0">
               <a:latin typeface="+mn-lt"/>
@@ -16542,6 +16038,106 @@
     <p:extLst>
       <p:ext uri="{BB962C8B-B14F-4D97-AF65-F5344CB8AC3E}">
         <p14:creationId xmlns:p14="http://schemas.microsoft.com/office/powerpoint/2010/main" val="4098127886"/>
+      </p:ext>
+    </p:extLst>
+  </p:cSld>
+  <p:clrMapOvr>
+    <a:masterClrMapping/>
+  </p:clrMapOvr>
+</p:sld>
+</file>
+
+<file path=ppt/slides/slide9.xml><?xml version="1.0" encoding="utf-8"?>
+<p:sld xmlns:a="http://schemas.openxmlformats.org/drawingml/2006/main" xmlns:r="http://schemas.openxmlformats.org/officeDocument/2006/relationships" xmlns:p="http://schemas.openxmlformats.org/presentationml/2006/main">
+  <p:cSld>
+    <p:spTree>
+      <p:nvGrpSpPr>
+        <p:cNvPr id="1" name=""/>
+        <p:cNvGrpSpPr/>
+        <p:nvPr/>
+      </p:nvGrpSpPr>
+      <p:grpSpPr>
+        <a:xfrm>
+          <a:off x="0" y="0"/>
+          <a:ext cx="0" cy="0"/>
+          <a:chOff x="0" y="0"/>
+          <a:chExt cx="0" cy="0"/>
+        </a:xfrm>
+      </p:grpSpPr>
+      <p:sp>
+        <p:nvSpPr>
+          <p:cNvPr id="2" name="Title 1">
+            <a:extLst>
+              <a:ext uri="{FF2B5EF4-FFF2-40B4-BE49-F238E27FC236}">
+                <a16:creationId xmlns:a16="http://schemas.microsoft.com/office/drawing/2014/main" id="{51DF3D98-3C30-4CFC-8643-C81E829C8C25}"/>
+              </a:ext>
+            </a:extLst>
+          </p:cNvPr>
+          <p:cNvSpPr>
+            <a:spLocks noGrp="1"/>
+          </p:cNvSpPr>
+          <p:nvPr>
+            <p:ph type="title"/>
+          </p:nvPr>
+        </p:nvSpPr>
+        <p:spPr>
+          <a:xfrm>
+            <a:off x="6896100" y="398440"/>
+            <a:ext cx="4903377" cy="2386081"/>
+          </a:xfrm>
+        </p:spPr>
+        <p:txBody>
+          <a:bodyPr/>
+          <a:lstStyle/>
+          <a:p>
+            <a:r>
+              <a:rPr lang="en-US" dirty="0"/>
+              <a:t>Thank you</a:t>
+            </a:r>
+          </a:p>
+        </p:txBody>
+      </p:sp>
+      <p:pic>
+        <p:nvPicPr>
+          <p:cNvPr id="13" name="Picture Placeholder 12" descr="Person running up stairs">
+            <a:extLst>
+              <a:ext uri="{FF2B5EF4-FFF2-40B4-BE49-F238E27FC236}">
+                <a16:creationId xmlns:a16="http://schemas.microsoft.com/office/drawing/2014/main" id="{EC944911-7CDD-41CC-A7F0-5B0CF85D545C}"/>
+              </a:ext>
+              <a:ext uri="{C183D7F6-B498-43B3-948B-1728B52AA6E4}">
+                <adec:decorative xmlns:adec="http://schemas.microsoft.com/office/drawing/2017/decorative" val="0"/>
+              </a:ext>
+            </a:extLst>
+          </p:cNvPr>
+          <p:cNvPicPr>
+            <a:picLocks noGrp="1" noChangeAspect="1"/>
+          </p:cNvPicPr>
+          <p:nvPr>
+            <p:ph type="pic" sz="quarter" idx="13"/>
+          </p:nvPr>
+        </p:nvPicPr>
+        <p:blipFill>
+          <a:blip r:embed="rId3">
+            <a:extLst>
+              <a:ext uri="{28A0092B-C50C-407E-A947-70E740481C1C}">
+                <a14:useLocalDpi xmlns:a14="http://schemas.microsoft.com/office/drawing/2010/main" val="0"/>
+              </a:ext>
+            </a:extLst>
+          </a:blip>
+          <a:srcRect/>
+          <a:stretch/>
+        </p:blipFill>
+        <p:spPr>
+          <a:xfrm>
+            <a:off x="0" y="0"/>
+            <a:ext cx="6096000" cy="6858000"/>
+          </a:xfrm>
+        </p:spPr>
+      </p:pic>
+    </p:spTree>
+    <p:extLst>
+      <p:ext uri="{BB962C8B-B14F-4D97-AF65-F5344CB8AC3E}">
+        <p14:creationId xmlns:p14="http://schemas.microsoft.com/office/powerpoint/2010/main" val="2336677316"/>
       </p:ext>
     </p:extLst>
   </p:cSld>
@@ -17343,6 +16939,15 @@
 </file>
 
 <file path=customXml/item1.xml><?xml version="1.0" encoding="utf-8"?>
+<?mso-contentType ?>
+<FormTemplates xmlns="http://schemas.microsoft.com/sharepoint/v3/contenttype/forms">
+  <Display>DocumentLibraryForm</Display>
+  <Edit>DocumentLibraryForm</Edit>
+  <New>DocumentLibraryForm</New>
+</FormTemplates>
+</file>
+
+<file path=customXml/item2.xml><?xml version="1.0" encoding="utf-8"?>
 <p:properties xmlns:p="http://schemas.microsoft.com/office/2006/metadata/properties" xmlns:xsi="http://www.w3.org/2001/XMLSchema-instance" xmlns:pc="http://schemas.microsoft.com/office/infopath/2007/PartnerControls">
   <documentManagement>
     <_ip_UnifiedCompliancePolicyUIAction xmlns="http://schemas.microsoft.com/sharepoint/v3" xsi:nil="true"/>
@@ -17360,15 +16965,6 @@
     <MediaServiceKeyPoints xmlns="71af3243-3dd4-4a8d-8c0d-dd76da1f02a5" xsi:nil="true"/>
   </documentManagement>
 </p:properties>
-</file>
-
-<file path=customXml/item2.xml><?xml version="1.0" encoding="utf-8"?>
-<?mso-contentType ?>
-<FormTemplates xmlns="http://schemas.microsoft.com/sharepoint/v3/contenttype/forms">
-  <Display>DocumentLibraryForm</Display>
-  <Edit>DocumentLibraryForm</Edit>
-  <New>DocumentLibraryForm</New>
-</FormTemplates>
 </file>
 
 <file path=customXml/item3.xml><?xml version="1.0" encoding="utf-8"?>
@@ -17684,6 +17280,14 @@
 </file>
 
 <file path=customXml/itemProps1.xml><?xml version="1.0" encoding="utf-8"?>
+<ds:datastoreItem xmlns:ds="http://schemas.openxmlformats.org/officeDocument/2006/customXml" ds:itemID="{D5B334C4-64A2-4673-803C-35178659DDD3}">
+  <ds:schemaRefs>
+    <ds:schemaRef ds:uri="http://schemas.microsoft.com/sharepoint/v3/contenttype/forms"/>
+  </ds:schemaRefs>
+</ds:datastoreItem>
+</file>
+
+<file path=customXml/itemProps2.xml><?xml version="1.0" encoding="utf-8"?>
 <ds:datastoreItem xmlns:ds="http://schemas.openxmlformats.org/officeDocument/2006/customXml" ds:itemID="{3593354B-8927-46EE-B294-4D51952A09C2}">
   <ds:schemaRefs>
     <ds:schemaRef ds:uri="http://schemas.microsoft.com/office/2006/metadata/properties"/>
@@ -17691,14 +17295,6 @@
     <ds:schemaRef ds:uri="http://schemas.microsoft.com/sharepoint/v3"/>
     <ds:schemaRef ds:uri="71af3243-3dd4-4a8d-8c0d-dd76da1f02a5"/>
     <ds:schemaRef ds:uri="230e9df3-be65-4c73-a93b-d1236ebd677e"/>
-  </ds:schemaRefs>
-</ds:datastoreItem>
-</file>
-
-<file path=customXml/itemProps2.xml><?xml version="1.0" encoding="utf-8"?>
-<ds:datastoreItem xmlns:ds="http://schemas.openxmlformats.org/officeDocument/2006/customXml" ds:itemID="{D5B334C4-64A2-4673-803C-35178659DDD3}">
-  <ds:schemaRefs>
-    <ds:schemaRef ds:uri="http://schemas.microsoft.com/sharepoint/v3/contenttype/forms"/>
   </ds:schemaRefs>
 </ds:datastoreItem>
 </file>

</xml_diff>